<commit_message>
Ajustes no arquivo ppt - nova visualização
</commit_message>
<xml_diff>
--- a/Criação de Template.pptx
+++ b/Criação de Template.pptx
@@ -272,7 +272,7 @@
           <a:p>
             <a:fld id="{DF71B4F2-0B47-4901-AF64-36B0060F3536}" type="datetimeFigureOut">
               <a:rPr lang="pt-BR" smtClean="0"/>
-              <a:t>23/01/2023</a:t>
+              <a:t>14/02/2023</a:t>
             </a:fld>
             <a:endParaRPr lang="pt-BR"/>
           </a:p>
@@ -470,7 +470,7 @@
           <a:p>
             <a:fld id="{DF71B4F2-0B47-4901-AF64-36B0060F3536}" type="datetimeFigureOut">
               <a:rPr lang="pt-BR" smtClean="0"/>
-              <a:t>23/01/2023</a:t>
+              <a:t>14/02/2023</a:t>
             </a:fld>
             <a:endParaRPr lang="pt-BR"/>
           </a:p>
@@ -678,7 +678,7 @@
           <a:p>
             <a:fld id="{DF71B4F2-0B47-4901-AF64-36B0060F3536}" type="datetimeFigureOut">
               <a:rPr lang="pt-BR" smtClean="0"/>
-              <a:t>23/01/2023</a:t>
+              <a:t>14/02/2023</a:t>
             </a:fld>
             <a:endParaRPr lang="pt-BR"/>
           </a:p>
@@ -876,7 +876,7 @@
           <a:p>
             <a:fld id="{DF71B4F2-0B47-4901-AF64-36B0060F3536}" type="datetimeFigureOut">
               <a:rPr lang="pt-BR" smtClean="0"/>
-              <a:t>23/01/2023</a:t>
+              <a:t>14/02/2023</a:t>
             </a:fld>
             <a:endParaRPr lang="pt-BR"/>
           </a:p>
@@ -1151,7 +1151,7 @@
           <a:p>
             <a:fld id="{DF71B4F2-0B47-4901-AF64-36B0060F3536}" type="datetimeFigureOut">
               <a:rPr lang="pt-BR" smtClean="0"/>
-              <a:t>23/01/2023</a:t>
+              <a:t>14/02/2023</a:t>
             </a:fld>
             <a:endParaRPr lang="pt-BR"/>
           </a:p>
@@ -1416,7 +1416,7 @@
           <a:p>
             <a:fld id="{DF71B4F2-0B47-4901-AF64-36B0060F3536}" type="datetimeFigureOut">
               <a:rPr lang="pt-BR" smtClean="0"/>
-              <a:t>23/01/2023</a:t>
+              <a:t>14/02/2023</a:t>
             </a:fld>
             <a:endParaRPr lang="pt-BR"/>
           </a:p>
@@ -1828,7 +1828,7 @@
           <a:p>
             <a:fld id="{DF71B4F2-0B47-4901-AF64-36B0060F3536}" type="datetimeFigureOut">
               <a:rPr lang="pt-BR" smtClean="0"/>
-              <a:t>23/01/2023</a:t>
+              <a:t>14/02/2023</a:t>
             </a:fld>
             <a:endParaRPr lang="pt-BR"/>
           </a:p>
@@ -1969,7 +1969,7 @@
           <a:p>
             <a:fld id="{DF71B4F2-0B47-4901-AF64-36B0060F3536}" type="datetimeFigureOut">
               <a:rPr lang="pt-BR" smtClean="0"/>
-              <a:t>23/01/2023</a:t>
+              <a:t>14/02/2023</a:t>
             </a:fld>
             <a:endParaRPr lang="pt-BR"/>
           </a:p>
@@ -2082,7 +2082,7 @@
           <a:p>
             <a:fld id="{DF71B4F2-0B47-4901-AF64-36B0060F3536}" type="datetimeFigureOut">
               <a:rPr lang="pt-BR" smtClean="0"/>
-              <a:t>23/01/2023</a:t>
+              <a:t>14/02/2023</a:t>
             </a:fld>
             <a:endParaRPr lang="pt-BR"/>
           </a:p>
@@ -2393,7 +2393,7 @@
           <a:p>
             <a:fld id="{DF71B4F2-0B47-4901-AF64-36B0060F3536}" type="datetimeFigureOut">
               <a:rPr lang="pt-BR" smtClean="0"/>
-              <a:t>23/01/2023</a:t>
+              <a:t>14/02/2023</a:t>
             </a:fld>
             <a:endParaRPr lang="pt-BR"/>
           </a:p>
@@ -2681,7 +2681,7 @@
           <a:p>
             <a:fld id="{DF71B4F2-0B47-4901-AF64-36B0060F3536}" type="datetimeFigureOut">
               <a:rPr lang="pt-BR" smtClean="0"/>
-              <a:t>23/01/2023</a:t>
+              <a:t>14/02/2023</a:t>
             </a:fld>
             <a:endParaRPr lang="pt-BR"/>
           </a:p>
@@ -2922,7 +2922,7 @@
           <a:p>
             <a:fld id="{DF71B4F2-0B47-4901-AF64-36B0060F3536}" type="datetimeFigureOut">
               <a:rPr lang="pt-BR" smtClean="0"/>
-              <a:t>23/01/2023</a:t>
+              <a:t>14/02/2023</a:t>
             </a:fld>
             <a:endParaRPr lang="pt-BR"/>
           </a:p>
@@ -3389,7 +3389,7 @@
         </p:nvSpPr>
         <p:spPr>
           <a:xfrm>
-            <a:off x="3547860" y="213612"/>
+            <a:off x="3391104" y="213612"/>
             <a:ext cx="5918870" cy="632012"/>
           </a:xfrm>
           <a:prstGeom prst="roundRect">
@@ -3423,8 +3423,13 @@
             <a:pPr algn="ctr"/>
             <a:r>
               <a:rPr lang="pt-BR" sz="3200" b="1" dirty="0"/>
-              <a:t>Gerenciamento de Atendimento</a:t>
-            </a:r>
+              <a:t>Gerenciamento </a:t>
+            </a:r>
+            <a:r>
+              <a:rPr lang="pt-BR" sz="3200" b="1" dirty="0" smtClean="0"/>
+              <a:t>dos Produtos</a:t>
+            </a:r>
+            <a:endParaRPr lang="pt-BR" sz="3200" b="1" dirty="0"/>
           </a:p>
         </p:txBody>
       </p:sp>
@@ -3442,7 +3447,7 @@
         </p:nvSpPr>
         <p:spPr>
           <a:xfrm>
-            <a:off x="10540369" y="27589"/>
+            <a:off x="10370550" y="27589"/>
             <a:ext cx="981636" cy="349625"/>
           </a:xfrm>
           <a:prstGeom prst="roundRect">
@@ -3993,9 +3998,10 @@
           <a:p>
             <a:pPr algn="ctr"/>
             <a:r>
-              <a:rPr lang="pt-BR" b="1" dirty="0"/>
-              <a:t>Total de Atendimentos</a:t>
-            </a:r>
+              <a:rPr lang="pt-BR" b="1" dirty="0" smtClean="0"/>
+              <a:t>Vendas x Categoria</a:t>
+            </a:r>
+            <a:endParaRPr lang="pt-BR" b="1" dirty="0"/>
           </a:p>
         </p:txBody>
       </p:sp>
@@ -4013,8 +4019,8 @@
         </p:nvSpPr>
         <p:spPr>
           <a:xfrm>
-            <a:off x="6769019" y="1262443"/>
-            <a:ext cx="2451847" cy="118038"/>
+            <a:off x="6664089" y="1247565"/>
+            <a:ext cx="2556777" cy="132916"/>
           </a:xfrm>
           <a:prstGeom prst="rect">
             <a:avLst/>
@@ -4046,9 +4052,18 @@
           <a:p>
             <a:pPr algn="ctr"/>
             <a:r>
+              <a:rPr lang="pt-BR" b="1" dirty="0" smtClean="0"/>
+              <a:t>Vendas </a:t>
+            </a:r>
+            <a:r>
               <a:rPr lang="pt-BR" b="1" dirty="0"/>
-              <a:t>Atendimento por Status</a:t>
-            </a:r>
+              <a:t>x</a:t>
+            </a:r>
+            <a:r>
+              <a:rPr lang="pt-BR" b="1" dirty="0" smtClean="0"/>
+              <a:t> Região</a:t>
+            </a:r>
+            <a:endParaRPr lang="pt-BR" b="1" dirty="0"/>
           </a:p>
         </p:txBody>
       </p:sp>
@@ -4099,9 +4114,10 @@
           <a:p>
             <a:pPr algn="ctr"/>
             <a:r>
-              <a:rPr lang="pt-BR" b="1" dirty="0"/>
-              <a:t>Tempo de Atendimento</a:t>
-            </a:r>
+              <a:rPr lang="pt-BR" b="1" dirty="0" smtClean="0"/>
+              <a:t>Vendas x Cidade</a:t>
+            </a:r>
+            <a:endParaRPr lang="pt-BR" b="1" dirty="0"/>
           </a:p>
         </p:txBody>
       </p:sp>
@@ -4152,9 +4168,10 @@
           <a:p>
             <a:pPr algn="ctr"/>
             <a:r>
-              <a:rPr lang="pt-BR" b="1" dirty="0"/>
-              <a:t>Total de Atendimento x Área</a:t>
-            </a:r>
+              <a:rPr lang="pt-BR" b="1" dirty="0" smtClean="0"/>
+              <a:t>Visão Geográfica das Vendas</a:t>
+            </a:r>
+            <a:endParaRPr lang="pt-BR" b="1" dirty="0"/>
           </a:p>
         </p:txBody>
       </p:sp>
@@ -4206,8 +4223,13 @@
             <a:pPr algn="ctr"/>
             <a:r>
               <a:rPr lang="pt-BR" b="1" dirty="0"/>
-              <a:t>Total de Chamadas por Dia</a:t>
-            </a:r>
+              <a:t>Total de Chamadas por </a:t>
+            </a:r>
+            <a:r>
+              <a:rPr lang="pt-BR" b="1" dirty="0" smtClean="0"/>
+              <a:t>Ano</a:t>
+            </a:r>
+            <a:endParaRPr lang="pt-BR" b="1" dirty="0"/>
           </a:p>
         </p:txBody>
       </p:sp>
@@ -4225,7 +4247,7 @@
         </p:nvSpPr>
         <p:spPr>
           <a:xfrm>
-            <a:off x="10667890" y="1048494"/>
+            <a:off x="10667890" y="1100746"/>
             <a:ext cx="1636360" cy="511010"/>
           </a:xfrm>
           <a:prstGeom prst="rect">
@@ -4258,16 +4280,14 @@
           <a:p>
             <a:pPr algn="ctr"/>
             <a:r>
-              <a:rPr lang="pt-BR" sz="1400" b="1" dirty="0"/>
-              <a:t>Total</a:t>
-            </a:r>
-          </a:p>
-          <a:p>
-            <a:pPr algn="ctr"/>
-            <a:r>
-              <a:rPr lang="pt-BR" sz="1400" b="1" dirty="0"/>
-              <a:t>Atendimentos</a:t>
-            </a:r>
+              <a:rPr lang="pt-BR" sz="1400" b="1" dirty="0" err="1" smtClean="0"/>
+              <a:t>Qtd</a:t>
+            </a:r>
+            <a:r>
+              <a:rPr lang="pt-BR" sz="1400" b="1" dirty="0" smtClean="0"/>
+              <a:t> de Clientes</a:t>
+            </a:r>
+            <a:endParaRPr lang="pt-BR" sz="1400" b="1" dirty="0"/>
           </a:p>
         </p:txBody>
       </p:sp>
@@ -4285,8 +4305,8 @@
         </p:nvSpPr>
         <p:spPr>
           <a:xfrm>
-            <a:off x="9338183" y="1236845"/>
-            <a:ext cx="1466681" cy="269350"/>
+            <a:off x="9287247" y="1247565"/>
+            <a:ext cx="1517618" cy="258630"/>
           </a:xfrm>
           <a:prstGeom prst="rect">
             <a:avLst/>
@@ -4318,9 +4338,10 @@
           <a:p>
             <a:pPr algn="ctr"/>
             <a:r>
-              <a:rPr lang="pt-BR" sz="1400" b="1" dirty="0"/>
-              <a:t>Atendentes</a:t>
-            </a:r>
+              <a:rPr lang="pt-BR" sz="1400" b="1" dirty="0" smtClean="0"/>
+              <a:t>Total de Produtos</a:t>
+            </a:r>
+            <a:endParaRPr lang="pt-BR" sz="1400" b="1" dirty="0"/>
           </a:p>
         </p:txBody>
       </p:sp>
@@ -4371,9 +4392,10 @@
           <a:p>
             <a:pPr algn="ctr"/>
             <a:r>
-              <a:rPr lang="pt-BR" sz="1400" b="1" dirty="0"/>
-              <a:t>Satisfação Média</a:t>
-            </a:r>
+              <a:rPr lang="pt-BR" sz="1400" b="1" dirty="0" smtClean="0"/>
+              <a:t>Total de Cidades</a:t>
+            </a:r>
+            <a:endParaRPr lang="pt-BR" sz="1400" b="1" dirty="0"/>
           </a:p>
         </p:txBody>
       </p:sp>
@@ -4424,9 +4446,14 @@
           <a:p>
             <a:pPr algn="ctr"/>
             <a:r>
-              <a:rPr lang="pt-BR" sz="1400" b="1" dirty="0"/>
-              <a:t>Tempo Espera</a:t>
-            </a:r>
+              <a:rPr lang="pt-BR" sz="1400" b="1" dirty="0" err="1" smtClean="0"/>
+              <a:t>Qtd</a:t>
+            </a:r>
+            <a:r>
+              <a:rPr lang="pt-BR" sz="1400" b="1" dirty="0" smtClean="0"/>
+              <a:t> de Vendas</a:t>
+            </a:r>
+            <a:endParaRPr lang="pt-BR" sz="1400" b="1" dirty="0"/>
           </a:p>
         </p:txBody>
       </p:sp>

</xml_diff>

<commit_message>
alterações no arquivo ppt
</commit_message>
<xml_diff>
--- a/Criação de Template.pptx
+++ b/Criação de Template.pptx
@@ -3389,7 +3389,7 @@
         </p:nvSpPr>
         <p:spPr>
           <a:xfrm>
-            <a:off x="3391104" y="213612"/>
+            <a:off x="3378041" y="213612"/>
             <a:ext cx="5918870" cy="632012"/>
           </a:xfrm>
           <a:prstGeom prst="roundRect">
@@ -3447,8 +3447,8 @@
         </p:nvSpPr>
         <p:spPr>
           <a:xfrm>
-            <a:off x="10370550" y="27589"/>
-            <a:ext cx="981636" cy="349625"/>
+            <a:off x="10344424" y="27589"/>
+            <a:ext cx="1082154" cy="349625"/>
           </a:xfrm>
           <a:prstGeom prst="roundRect">
             <a:avLst/>
@@ -3480,9 +3480,10 @@
           <a:p>
             <a:pPr algn="ctr"/>
             <a:r>
-              <a:rPr lang="pt-BR" sz="1600" b="1" dirty="0"/>
+              <a:rPr lang="pt-BR" sz="1900" b="1" dirty="0" smtClean="0"/>
               <a:t>Período</a:t>
             </a:r>
+            <a:endParaRPr lang="pt-BR" sz="1900" b="1" dirty="0"/>
           </a:p>
         </p:txBody>
       </p:sp>
@@ -4081,7 +4082,7 @@
         </p:nvSpPr>
         <p:spPr>
           <a:xfrm>
-            <a:off x="3861054" y="1265851"/>
+            <a:off x="3861054" y="1278914"/>
             <a:ext cx="2447365" cy="80680"/>
           </a:xfrm>
           <a:prstGeom prst="rect">
@@ -4135,8 +4136,8 @@
         </p:nvSpPr>
         <p:spPr>
           <a:xfrm>
-            <a:off x="477372" y="4124886"/>
-            <a:ext cx="2939536" cy="102397"/>
+            <a:off x="438183" y="4077062"/>
+            <a:ext cx="3206354" cy="176348"/>
           </a:xfrm>
           <a:prstGeom prst="rect">
             <a:avLst/>
@@ -4168,10 +4169,10 @@
           <a:p>
             <a:pPr algn="ctr"/>
             <a:r>
-              <a:rPr lang="pt-BR" b="1" dirty="0" smtClean="0"/>
+              <a:rPr lang="pt-BR" sz="2000" b="1" dirty="0" smtClean="0"/>
               <a:t>Visão Geográfica das Vendas</a:t>
             </a:r>
-            <a:endParaRPr lang="pt-BR" b="1" dirty="0"/>
+            <a:endParaRPr lang="pt-BR" sz="2000" b="1" dirty="0"/>
           </a:p>
         </p:txBody>
       </p:sp>
@@ -4189,7 +4190,7 @@
         </p:nvSpPr>
         <p:spPr>
           <a:xfrm>
-            <a:off x="6464848" y="3986716"/>
+            <a:off x="6464848" y="4012842"/>
             <a:ext cx="3623029" cy="377624"/>
           </a:xfrm>
           <a:prstGeom prst="rect">
@@ -4222,14 +4223,14 @@
           <a:p>
             <a:pPr algn="ctr"/>
             <a:r>
-              <a:rPr lang="pt-BR" b="1" dirty="0"/>
+              <a:rPr lang="pt-BR" sz="2000" b="1" dirty="0"/>
               <a:t>Total de Chamadas por </a:t>
             </a:r>
             <a:r>
-              <a:rPr lang="pt-BR" b="1" dirty="0" smtClean="0"/>
+              <a:rPr lang="pt-BR" sz="2000" b="1" dirty="0" smtClean="0"/>
               <a:t>Ano</a:t>
             </a:r>
-            <a:endParaRPr lang="pt-BR" b="1" dirty="0"/>
+            <a:endParaRPr lang="pt-BR" sz="2000" b="1" dirty="0"/>
           </a:p>
         </p:txBody>
       </p:sp>
@@ -4301,8 +4302,8 @@
         </p:nvSpPr>
         <p:spPr>
           <a:xfrm>
-            <a:off x="9287247" y="1247565"/>
-            <a:ext cx="1517618" cy="258630"/>
+            <a:off x="9274184" y="1240901"/>
+            <a:ext cx="1582576" cy="265294"/>
           </a:xfrm>
           <a:prstGeom prst="rect">
             <a:avLst/>
@@ -4335,7 +4336,7 @@
             <a:pPr algn="ctr"/>
             <a:r>
               <a:rPr lang="pt-BR" sz="1400" b="1" dirty="0" smtClean="0"/>
-              <a:t>Total de Produtos</a:t>
+              <a:t>Produtos Vendidos</a:t>
             </a:r>
             <a:endParaRPr lang="pt-BR" sz="1400" b="1" dirty="0"/>
           </a:p>
@@ -4443,7 +4444,11 @@
             <a:pPr algn="ctr"/>
             <a:r>
               <a:rPr lang="pt-BR" sz="1400" b="1" dirty="0" smtClean="0"/>
-              <a:t>Qtd de Vendas</a:t>
+              <a:t>Qtd de </a:t>
+            </a:r>
+            <a:r>
+              <a:rPr lang="pt-BR" sz="1400" b="1" dirty="0" smtClean="0"/>
+              <a:t>Marcas</a:t>
             </a:r>
             <a:endParaRPr lang="pt-BR" sz="1400" b="1" dirty="0"/>
           </a:p>

</xml_diff>

<commit_message>
Inserção de dados no pbix e ajustes no ppt
</commit_message>
<xml_diff>
--- a/Criação de Template.pptx
+++ b/Criação de Template.pptx
@@ -3916,7 +3916,7 @@
         </p:nvSpPr>
         <p:spPr>
           <a:xfrm>
-            <a:off x="10778942" y="2725188"/>
+            <a:off x="10807470" y="2744982"/>
             <a:ext cx="1357200" cy="910800"/>
           </a:xfrm>
           <a:prstGeom prst="roundRect">
@@ -3966,7 +3966,7 @@
         </p:nvSpPr>
         <p:spPr>
           <a:xfrm>
-            <a:off x="560295" y="1277479"/>
+            <a:off x="560295" y="990093"/>
             <a:ext cx="2371164" cy="45719"/>
           </a:xfrm>
           <a:prstGeom prst="rect">
@@ -4020,7 +4020,7 @@
         </p:nvSpPr>
         <p:spPr>
           <a:xfrm>
-            <a:off x="6664089" y="1247565"/>
+            <a:off x="6716341" y="960179"/>
             <a:ext cx="2556777" cy="132916"/>
           </a:xfrm>
           <a:prstGeom prst="rect">
@@ -4082,7 +4082,7 @@
         </p:nvSpPr>
         <p:spPr>
           <a:xfrm>
-            <a:off x="3861054" y="1278914"/>
+            <a:off x="3877048" y="1015871"/>
             <a:ext cx="2447365" cy="80680"/>
           </a:xfrm>
           <a:prstGeom prst="rect">
@@ -4444,11 +4444,7 @@
             <a:pPr algn="ctr"/>
             <a:r>
               <a:rPr lang="pt-BR" sz="1400" b="1" dirty="0" smtClean="0"/>
-              <a:t>Qtd de </a:t>
-            </a:r>
-            <a:r>
-              <a:rPr lang="pt-BR" sz="1400" b="1" dirty="0" smtClean="0"/>
-              <a:t>Marcas</a:t>
+              <a:t>Qtd de Marcas</a:t>
             </a:r>
             <a:endParaRPr lang="pt-BR" sz="1400" b="1" dirty="0"/>
           </a:p>
@@ -4469,8 +4465,8 @@
         </p:nvSpPr>
         <p:spPr>
           <a:xfrm>
-            <a:off x="396805" y="213612"/>
-            <a:ext cx="851569" cy="728472"/>
+            <a:off x="203525" y="161360"/>
+            <a:ext cx="609035" cy="530971"/>
           </a:xfrm>
           <a:prstGeom prst="actionButtonHome">
             <a:avLst/>

</xml_diff>

<commit_message>
Alterações no arquivo pbix e ppt
</commit_message>
<xml_diff>
--- a/Criação de Template.pptx
+++ b/Criação de Template.pptx
@@ -272,7 +272,7 @@
           <a:p>
             <a:fld id="{DF71B4F2-0B47-4901-AF64-36B0060F3536}" type="datetimeFigureOut">
               <a:rPr lang="pt-BR" smtClean="0"/>
-              <a:t>14/02/2023</a:t>
+              <a:t>17/02/2023</a:t>
             </a:fld>
             <a:endParaRPr lang="pt-BR"/>
           </a:p>
@@ -470,7 +470,7 @@
           <a:p>
             <a:fld id="{DF71B4F2-0B47-4901-AF64-36B0060F3536}" type="datetimeFigureOut">
               <a:rPr lang="pt-BR" smtClean="0"/>
-              <a:t>14/02/2023</a:t>
+              <a:t>17/02/2023</a:t>
             </a:fld>
             <a:endParaRPr lang="pt-BR"/>
           </a:p>
@@ -678,7 +678,7 @@
           <a:p>
             <a:fld id="{DF71B4F2-0B47-4901-AF64-36B0060F3536}" type="datetimeFigureOut">
               <a:rPr lang="pt-BR" smtClean="0"/>
-              <a:t>14/02/2023</a:t>
+              <a:t>17/02/2023</a:t>
             </a:fld>
             <a:endParaRPr lang="pt-BR"/>
           </a:p>
@@ -876,7 +876,7 @@
           <a:p>
             <a:fld id="{DF71B4F2-0B47-4901-AF64-36B0060F3536}" type="datetimeFigureOut">
               <a:rPr lang="pt-BR" smtClean="0"/>
-              <a:t>14/02/2023</a:t>
+              <a:t>17/02/2023</a:t>
             </a:fld>
             <a:endParaRPr lang="pt-BR"/>
           </a:p>
@@ -1151,7 +1151,7 @@
           <a:p>
             <a:fld id="{DF71B4F2-0B47-4901-AF64-36B0060F3536}" type="datetimeFigureOut">
               <a:rPr lang="pt-BR" smtClean="0"/>
-              <a:t>14/02/2023</a:t>
+              <a:t>17/02/2023</a:t>
             </a:fld>
             <a:endParaRPr lang="pt-BR"/>
           </a:p>
@@ -1416,7 +1416,7 @@
           <a:p>
             <a:fld id="{DF71B4F2-0B47-4901-AF64-36B0060F3536}" type="datetimeFigureOut">
               <a:rPr lang="pt-BR" smtClean="0"/>
-              <a:t>14/02/2023</a:t>
+              <a:t>17/02/2023</a:t>
             </a:fld>
             <a:endParaRPr lang="pt-BR"/>
           </a:p>
@@ -1828,7 +1828,7 @@
           <a:p>
             <a:fld id="{DF71B4F2-0B47-4901-AF64-36B0060F3536}" type="datetimeFigureOut">
               <a:rPr lang="pt-BR" smtClean="0"/>
-              <a:t>14/02/2023</a:t>
+              <a:t>17/02/2023</a:t>
             </a:fld>
             <a:endParaRPr lang="pt-BR"/>
           </a:p>
@@ -1969,7 +1969,7 @@
           <a:p>
             <a:fld id="{DF71B4F2-0B47-4901-AF64-36B0060F3536}" type="datetimeFigureOut">
               <a:rPr lang="pt-BR" smtClean="0"/>
-              <a:t>14/02/2023</a:t>
+              <a:t>17/02/2023</a:t>
             </a:fld>
             <a:endParaRPr lang="pt-BR"/>
           </a:p>
@@ -2082,7 +2082,7 @@
           <a:p>
             <a:fld id="{DF71B4F2-0B47-4901-AF64-36B0060F3536}" type="datetimeFigureOut">
               <a:rPr lang="pt-BR" smtClean="0"/>
-              <a:t>14/02/2023</a:t>
+              <a:t>17/02/2023</a:t>
             </a:fld>
             <a:endParaRPr lang="pt-BR"/>
           </a:p>
@@ -2393,7 +2393,7 @@
           <a:p>
             <a:fld id="{DF71B4F2-0B47-4901-AF64-36B0060F3536}" type="datetimeFigureOut">
               <a:rPr lang="pt-BR" smtClean="0"/>
-              <a:t>14/02/2023</a:t>
+              <a:t>17/02/2023</a:t>
             </a:fld>
             <a:endParaRPr lang="pt-BR"/>
           </a:p>
@@ -2681,7 +2681,7 @@
           <a:p>
             <a:fld id="{DF71B4F2-0B47-4901-AF64-36B0060F3536}" type="datetimeFigureOut">
               <a:rPr lang="pt-BR" smtClean="0"/>
-              <a:t>14/02/2023</a:t>
+              <a:t>17/02/2023</a:t>
             </a:fld>
             <a:endParaRPr lang="pt-BR"/>
           </a:p>
@@ -2922,7 +2922,7 @@
           <a:p>
             <a:fld id="{DF71B4F2-0B47-4901-AF64-36B0060F3536}" type="datetimeFigureOut">
               <a:rPr lang="pt-BR" smtClean="0"/>
-              <a:t>14/02/2023</a:t>
+              <a:t>17/02/2023</a:t>
             </a:fld>
             <a:endParaRPr lang="pt-BR"/>
           </a:p>
@@ -3389,7 +3389,7 @@
         </p:nvSpPr>
         <p:spPr>
           <a:xfrm>
-            <a:off x="3378041" y="213612"/>
+            <a:off x="3378041" y="2592"/>
             <a:ext cx="5918870" cy="632012"/>
           </a:xfrm>
           <a:prstGeom prst="roundRect">
@@ -3607,8 +3607,8 @@
         </p:nvSpPr>
         <p:spPr>
           <a:xfrm>
-            <a:off x="6669740" y="1143002"/>
-            <a:ext cx="2606567" cy="2743200"/>
+            <a:off x="6669739" y="1143002"/>
+            <a:ext cx="3247200" cy="2743200"/>
           </a:xfrm>
           <a:prstGeom prst="roundRect">
             <a:avLst/>
@@ -3766,8 +3766,8 @@
         </p:nvSpPr>
         <p:spPr>
           <a:xfrm>
-            <a:off x="9377925" y="1474656"/>
-            <a:ext cx="1357200" cy="911629"/>
+            <a:off x="10057776" y="1555885"/>
+            <a:ext cx="958078" cy="911629"/>
           </a:xfrm>
           <a:prstGeom prst="roundRect">
             <a:avLst/>
@@ -3816,8 +3816,8 @@
         </p:nvSpPr>
         <p:spPr>
           <a:xfrm>
-            <a:off x="10790685" y="1497789"/>
-            <a:ext cx="1357200" cy="910800"/>
+            <a:off x="11164387" y="1555885"/>
+            <a:ext cx="958078" cy="910800"/>
           </a:xfrm>
           <a:prstGeom prst="roundRect">
             <a:avLst/>
@@ -3866,8 +3866,8 @@
         </p:nvSpPr>
         <p:spPr>
           <a:xfrm>
-            <a:off x="9391363" y="2747492"/>
-            <a:ext cx="1357200" cy="910800"/>
+            <a:off x="10057776" y="2986648"/>
+            <a:ext cx="958078" cy="910800"/>
           </a:xfrm>
           <a:prstGeom prst="roundRect">
             <a:avLst/>
@@ -3916,8 +3916,8 @@
         </p:nvSpPr>
         <p:spPr>
           <a:xfrm>
-            <a:off x="10807470" y="2744982"/>
-            <a:ext cx="1357200" cy="910800"/>
+            <a:off x="11164387" y="2984138"/>
+            <a:ext cx="958078" cy="910800"/>
           </a:xfrm>
           <a:prstGeom prst="roundRect">
             <a:avLst/>
@@ -3966,7 +3966,7 @@
         </p:nvSpPr>
         <p:spPr>
           <a:xfrm>
-            <a:off x="560295" y="990093"/>
+            <a:off x="616566" y="903907"/>
             <a:ext cx="2371164" cy="45719"/>
           </a:xfrm>
           <a:prstGeom prst="rect">
@@ -3999,10 +3999,14 @@
           <a:p>
             <a:pPr algn="ctr"/>
             <a:r>
-              <a:rPr lang="pt-BR" sz="2000" b="1" dirty="0" smtClean="0"/>
-              <a:t>Vendas x Categoria</a:t>
-            </a:r>
-            <a:endParaRPr lang="pt-BR" sz="2000" b="1" dirty="0"/>
+              <a:rPr lang="pt-BR" sz="1900" b="1" dirty="0" smtClean="0"/>
+              <a:t>Vendas x </a:t>
+            </a:r>
+            <a:r>
+              <a:rPr lang="pt-BR" sz="1900" b="1" dirty="0" smtClean="0"/>
+              <a:t>Região</a:t>
+            </a:r>
+            <a:endParaRPr lang="pt-BR" sz="1900" b="1" dirty="0"/>
           </a:p>
         </p:txBody>
       </p:sp>
@@ -4020,8 +4024,8 @@
         </p:nvSpPr>
         <p:spPr>
           <a:xfrm>
-            <a:off x="6716341" y="960179"/>
-            <a:ext cx="2556777" cy="132916"/>
+            <a:off x="7068034" y="903907"/>
+            <a:ext cx="2372400" cy="46800"/>
           </a:xfrm>
           <a:prstGeom prst="rect">
             <a:avLst/>
@@ -4053,18 +4057,22 @@
           <a:p>
             <a:pPr algn="ctr"/>
             <a:r>
-              <a:rPr lang="pt-BR" sz="2000" b="1" dirty="0" smtClean="0"/>
+              <a:rPr lang="pt-BR" sz="1900" b="1" dirty="0" smtClean="0"/>
               <a:t>Vendas </a:t>
             </a:r>
             <a:r>
-              <a:rPr lang="pt-BR" sz="2000" b="1" dirty="0"/>
+              <a:rPr lang="pt-BR" sz="1900" b="1" dirty="0"/>
               <a:t>x</a:t>
             </a:r>
             <a:r>
-              <a:rPr lang="pt-BR" sz="2000" b="1" dirty="0" smtClean="0"/>
-              <a:t> Região</a:t>
-            </a:r>
-            <a:endParaRPr lang="pt-BR" sz="2000" b="1" dirty="0"/>
+              <a:rPr lang="pt-BR" sz="1900" b="1" dirty="0" smtClean="0"/>
+              <a:t> </a:t>
+            </a:r>
+            <a:r>
+              <a:rPr lang="pt-BR" sz="1900" b="1" dirty="0" smtClean="0"/>
+              <a:t>Categoria</a:t>
+            </a:r>
+            <a:endParaRPr lang="pt-BR" sz="1900" b="1" dirty="0"/>
           </a:p>
         </p:txBody>
       </p:sp>
@@ -4082,8 +4090,8 @@
         </p:nvSpPr>
         <p:spPr>
           <a:xfrm>
-            <a:off x="3877048" y="1015871"/>
-            <a:ext cx="2447365" cy="80680"/>
+            <a:off x="3890111" y="916671"/>
+            <a:ext cx="2372400" cy="46800"/>
           </a:xfrm>
           <a:prstGeom prst="rect">
             <a:avLst/>
@@ -4115,10 +4123,10 @@
           <a:p>
             <a:pPr algn="ctr"/>
             <a:r>
-              <a:rPr lang="pt-BR" sz="2000" b="1" dirty="0" smtClean="0"/>
-              <a:t>Vendas x Cidade</a:t>
-            </a:r>
-            <a:endParaRPr lang="pt-BR" sz="2000" b="1" dirty="0"/>
+              <a:rPr lang="pt-BR" sz="1900" b="1" dirty="0" smtClean="0"/>
+              <a:t>Vendas x Ano</a:t>
+            </a:r>
+            <a:endParaRPr lang="pt-BR" sz="1900" b="1" dirty="0"/>
           </a:p>
         </p:txBody>
       </p:sp>
@@ -4169,10 +4177,10 @@
           <a:p>
             <a:pPr algn="ctr"/>
             <a:r>
-              <a:rPr lang="pt-BR" sz="2000" b="1" dirty="0" smtClean="0"/>
+              <a:rPr lang="pt-BR" sz="1900" b="1" dirty="0" smtClean="0"/>
               <a:t>Visão Geográfica das Vendas</a:t>
             </a:r>
-            <a:endParaRPr lang="pt-BR" sz="2000" b="1" dirty="0"/>
+            <a:endParaRPr lang="pt-BR" sz="1900" b="1" dirty="0"/>
           </a:p>
         </p:txBody>
       </p:sp>
@@ -4223,14 +4231,10 @@
           <a:p>
             <a:pPr algn="ctr"/>
             <a:r>
-              <a:rPr lang="pt-BR" sz="2000" b="1" dirty="0"/>
-              <a:t>Total de Chamadas por </a:t>
-            </a:r>
-            <a:r>
-              <a:rPr lang="pt-BR" sz="2000" b="1" dirty="0" smtClean="0"/>
-              <a:t>Ano</a:t>
-            </a:r>
-            <a:endParaRPr lang="pt-BR" sz="2000" b="1" dirty="0"/>
+              <a:rPr lang="pt-BR" sz="1900" b="1" dirty="0" smtClean="0"/>
+              <a:t>Vendas x Cidade</a:t>
+            </a:r>
+            <a:endParaRPr lang="pt-BR" sz="1900" b="1" dirty="0"/>
           </a:p>
         </p:txBody>
       </p:sp>
@@ -4248,8 +4252,8 @@
         </p:nvSpPr>
         <p:spPr>
           <a:xfrm>
-            <a:off x="10667890" y="1100746"/>
-            <a:ext cx="1636360" cy="511010"/>
+            <a:off x="11122182" y="1086678"/>
+            <a:ext cx="1111727" cy="511010"/>
           </a:xfrm>
           <a:prstGeom prst="rect">
             <a:avLst/>
@@ -4282,7 +4286,14 @@
             <a:pPr algn="ctr"/>
             <a:r>
               <a:rPr lang="pt-BR" sz="1400" b="1" dirty="0" smtClean="0"/>
-              <a:t>Qtd de Clientes</a:t>
+              <a:t>Quantidade</a:t>
+            </a:r>
+          </a:p>
+          <a:p>
+            <a:pPr algn="ctr"/>
+            <a:r>
+              <a:rPr lang="pt-BR" sz="1400" b="1" dirty="0" smtClean="0"/>
+              <a:t>Clientes</a:t>
             </a:r>
             <a:endParaRPr lang="pt-BR" sz="1400" b="1" dirty="0"/>
           </a:p>
@@ -4302,8 +4313,8 @@
         </p:nvSpPr>
         <p:spPr>
           <a:xfrm>
-            <a:off x="9274184" y="1240901"/>
-            <a:ext cx="1582576" cy="265294"/>
+            <a:off x="10090115" y="1170563"/>
+            <a:ext cx="882689" cy="273702"/>
           </a:xfrm>
           <a:prstGeom prst="rect">
             <a:avLst/>
@@ -4336,7 +4347,15 @@
             <a:pPr algn="ctr"/>
             <a:r>
               <a:rPr lang="pt-BR" sz="1400" b="1" dirty="0" smtClean="0"/>
-              <a:t>Produtos Vendidos</a:t>
+              <a:t>Produtos </a:t>
+            </a:r>
+            <a:endParaRPr lang="pt-BR" sz="1400" b="1" dirty="0" smtClean="0"/>
+          </a:p>
+          <a:p>
+            <a:pPr algn="ctr"/>
+            <a:r>
+              <a:rPr lang="pt-BR" sz="1400" b="1" dirty="0" smtClean="0"/>
+              <a:t>Vendidos</a:t>
             </a:r>
             <a:endParaRPr lang="pt-BR" sz="1400" b="1" dirty="0"/>
           </a:p>
@@ -4356,8 +4375,8 @@
         </p:nvSpPr>
         <p:spPr>
           <a:xfrm>
-            <a:off x="9281958" y="2378264"/>
-            <a:ext cx="1587865" cy="511010"/>
+            <a:off x="10027668" y="2490808"/>
+            <a:ext cx="1063661" cy="511010"/>
           </a:xfrm>
           <a:prstGeom prst="rect">
             <a:avLst/>
@@ -4390,7 +4409,14 @@
             <a:pPr algn="ctr"/>
             <a:r>
               <a:rPr lang="pt-BR" sz="1400" b="1" dirty="0" smtClean="0"/>
-              <a:t>Total de Cidades</a:t>
+              <a:t>Quantidade </a:t>
+            </a:r>
+          </a:p>
+          <a:p>
+            <a:pPr algn="ctr"/>
+            <a:r>
+              <a:rPr lang="pt-BR" sz="1400" b="1" dirty="0" smtClean="0"/>
+              <a:t>Cidades</a:t>
             </a:r>
             <a:endParaRPr lang="pt-BR" sz="1400" b="1" dirty="0"/>
           </a:p>
@@ -4410,8 +4436,8 @@
         </p:nvSpPr>
         <p:spPr>
           <a:xfrm>
-            <a:off x="10767266" y="2364469"/>
-            <a:ext cx="1411355" cy="511010"/>
+            <a:off x="11098291" y="2505149"/>
+            <a:ext cx="1066262" cy="511010"/>
           </a:xfrm>
           <a:prstGeom prst="rect">
             <a:avLst/>
@@ -4444,7 +4470,14 @@
             <a:pPr algn="ctr"/>
             <a:r>
               <a:rPr lang="pt-BR" sz="1400" b="1" dirty="0" smtClean="0"/>
-              <a:t>Qtd de Marcas</a:t>
+              <a:t>Quantidade</a:t>
+            </a:r>
+          </a:p>
+          <a:p>
+            <a:pPr algn="ctr"/>
+            <a:r>
+              <a:rPr lang="pt-BR" sz="1400" b="1" dirty="0" smtClean="0"/>
+              <a:t>Marcas</a:t>
             </a:r>
             <a:endParaRPr lang="pt-BR" sz="1400" b="1" dirty="0"/>
           </a:p>

</xml_diff>

<commit_message>
Alterações no layout ppt e pbix
</commit_message>
<xml_diff>
--- a/Criação de Template.pptx
+++ b/Criação de Template.pptx
@@ -3660,8 +3660,8 @@
         </p:nvSpPr>
         <p:spPr>
           <a:xfrm>
-            <a:off x="53789" y="4037929"/>
-            <a:ext cx="3857235" cy="2850776"/>
+            <a:off x="53790" y="4037929"/>
+            <a:ext cx="3246972" cy="2850776"/>
           </a:xfrm>
           <a:prstGeom prst="roundRect">
             <a:avLst/>
@@ -3713,8 +3713,8 @@
         </p:nvSpPr>
         <p:spPr>
           <a:xfrm>
-            <a:off x="3966882" y="4037929"/>
-            <a:ext cx="8169260" cy="2850776"/>
+            <a:off x="3354552" y="4037929"/>
+            <a:ext cx="8781591" cy="2850776"/>
           </a:xfrm>
           <a:prstGeom prst="roundRect">
             <a:avLst/>
@@ -4000,11 +4000,7 @@
             <a:pPr algn="ctr"/>
             <a:r>
               <a:rPr lang="pt-BR" sz="1900" b="1" dirty="0" smtClean="0"/>
-              <a:t>Vendas x </a:t>
-            </a:r>
-            <a:r>
-              <a:rPr lang="pt-BR" sz="1900" b="1" dirty="0" smtClean="0"/>
-              <a:t>Região</a:t>
+              <a:t>Vendas x Região</a:t>
             </a:r>
             <a:endParaRPr lang="pt-BR" sz="1900" b="1" dirty="0"/>
           </a:p>
@@ -4066,11 +4062,7 @@
             </a:r>
             <a:r>
               <a:rPr lang="pt-BR" sz="1900" b="1" dirty="0" smtClean="0"/>
-              <a:t> </a:t>
-            </a:r>
-            <a:r>
-              <a:rPr lang="pt-BR" sz="1900" b="1" dirty="0" smtClean="0"/>
-              <a:t>Categoria</a:t>
+              <a:t> Produto</a:t>
             </a:r>
             <a:endParaRPr lang="pt-BR" sz="1900" b="1" dirty="0"/>
           </a:p>
@@ -4144,7 +4136,7 @@
         </p:nvSpPr>
         <p:spPr>
           <a:xfrm>
-            <a:off x="438183" y="4077062"/>
+            <a:off x="100562" y="4077062"/>
             <a:ext cx="3206354" cy="176348"/>
           </a:xfrm>
           <a:prstGeom prst="rect">
@@ -4178,7 +4170,7 @@
             <a:pPr algn="ctr"/>
             <a:r>
               <a:rPr lang="pt-BR" sz="1900" b="1" dirty="0" smtClean="0"/>
-              <a:t>Visão Geográfica das Vendas</a:t>
+              <a:t>Vendas x Categoria</a:t>
             </a:r>
             <a:endParaRPr lang="pt-BR" sz="1900" b="1" dirty="0"/>
           </a:p>
@@ -4198,7 +4190,7 @@
         </p:nvSpPr>
         <p:spPr>
           <a:xfrm>
-            <a:off x="6464848" y="4012842"/>
+            <a:off x="5945577" y="3974678"/>
             <a:ext cx="3623029" cy="377624"/>
           </a:xfrm>
           <a:prstGeom prst="rect">
@@ -4349,7 +4341,6 @@
               <a:rPr lang="pt-BR" sz="1400" b="1" dirty="0" smtClean="0"/>
               <a:t>Produtos </a:t>
             </a:r>
-            <a:endParaRPr lang="pt-BR" sz="1400" b="1" dirty="0" smtClean="0"/>
           </a:p>
           <a:p>
             <a:pPr algn="ctr"/>

</xml_diff>

<commit_message>
Novas alterações de layout e estrutura dos campos no pbix
</commit_message>
<xml_diff>
--- a/Criação de Template.pptx
+++ b/Criação de Template.pptx
@@ -3389,7 +3389,7 @@
         </p:nvSpPr>
         <p:spPr>
           <a:xfrm>
-            <a:off x="3378041" y="2592"/>
+            <a:off x="2685709" y="2592"/>
             <a:ext cx="5918870" cy="632012"/>
           </a:xfrm>
           <a:prstGeom prst="roundRect">
@@ -3422,12 +3422,8 @@
           <a:p>
             <a:pPr algn="ctr"/>
             <a:r>
-              <a:rPr lang="pt-BR" sz="3200" b="1" dirty="0"/>
-              <a:t>Gerenciamento </a:t>
-            </a:r>
-            <a:r>
               <a:rPr lang="pt-BR" sz="3200" b="1" dirty="0" smtClean="0"/>
-              <a:t>dos Produtos</a:t>
+              <a:t>Acompanhamento das Vendas</a:t>
             </a:r>
             <a:endParaRPr lang="pt-BR" sz="3200" b="1" dirty="0"/>
           </a:p>
@@ -4244,7 +4240,7 @@
         </p:nvSpPr>
         <p:spPr>
           <a:xfrm>
-            <a:off x="11122182" y="1086678"/>
+            <a:off x="11096056" y="1086678"/>
             <a:ext cx="1111727" cy="511010"/>
           </a:xfrm>
           <a:prstGeom prst="rect">
@@ -4489,8 +4485,8 @@
         </p:nvSpPr>
         <p:spPr>
           <a:xfrm>
-            <a:off x="203525" y="161360"/>
-            <a:ext cx="609035" cy="530971"/>
+            <a:off x="203525" y="161361"/>
+            <a:ext cx="527995" cy="473244"/>
           </a:xfrm>
           <a:prstGeom prst="actionButtonHome">
             <a:avLst/>

</xml_diff>

<commit_message>
Alterações no dash do ppt e pbix e inclusao de novo arquivo jpeg
</commit_message>
<xml_diff>
--- a/Criação de Template.pptx
+++ b/Criação de Template.pptx
@@ -6,7 +6,8 @@
   </p:sldMasterIdLst>
   <p:sldIdLst>
     <p:sldId id="256" r:id="rId2"/>
-    <p:sldId id="257" r:id="rId3"/>
+    <p:sldId id="258" r:id="rId3"/>
+    <p:sldId id="257" r:id="rId4"/>
   </p:sldIdLst>
   <p:sldSz cx="12192000" cy="6858000"/>
   <p:notesSz cx="6858000" cy="9144000"/>
@@ -272,7 +273,7 @@
           <a:p>
             <a:fld id="{DF71B4F2-0B47-4901-AF64-36B0060F3536}" type="datetimeFigureOut">
               <a:rPr lang="pt-BR" smtClean="0"/>
-              <a:t>17/02/2023</a:t>
+              <a:t>19/02/2023</a:t>
             </a:fld>
             <a:endParaRPr lang="pt-BR"/>
           </a:p>
@@ -470,7 +471,7 @@
           <a:p>
             <a:fld id="{DF71B4F2-0B47-4901-AF64-36B0060F3536}" type="datetimeFigureOut">
               <a:rPr lang="pt-BR" smtClean="0"/>
-              <a:t>17/02/2023</a:t>
+              <a:t>19/02/2023</a:t>
             </a:fld>
             <a:endParaRPr lang="pt-BR"/>
           </a:p>
@@ -678,7 +679,7 @@
           <a:p>
             <a:fld id="{DF71B4F2-0B47-4901-AF64-36B0060F3536}" type="datetimeFigureOut">
               <a:rPr lang="pt-BR" smtClean="0"/>
-              <a:t>17/02/2023</a:t>
+              <a:t>19/02/2023</a:t>
             </a:fld>
             <a:endParaRPr lang="pt-BR"/>
           </a:p>
@@ -876,7 +877,7 @@
           <a:p>
             <a:fld id="{DF71B4F2-0B47-4901-AF64-36B0060F3536}" type="datetimeFigureOut">
               <a:rPr lang="pt-BR" smtClean="0"/>
-              <a:t>17/02/2023</a:t>
+              <a:t>19/02/2023</a:t>
             </a:fld>
             <a:endParaRPr lang="pt-BR"/>
           </a:p>
@@ -1151,7 +1152,7 @@
           <a:p>
             <a:fld id="{DF71B4F2-0B47-4901-AF64-36B0060F3536}" type="datetimeFigureOut">
               <a:rPr lang="pt-BR" smtClean="0"/>
-              <a:t>17/02/2023</a:t>
+              <a:t>19/02/2023</a:t>
             </a:fld>
             <a:endParaRPr lang="pt-BR"/>
           </a:p>
@@ -1416,7 +1417,7 @@
           <a:p>
             <a:fld id="{DF71B4F2-0B47-4901-AF64-36B0060F3536}" type="datetimeFigureOut">
               <a:rPr lang="pt-BR" smtClean="0"/>
-              <a:t>17/02/2023</a:t>
+              <a:t>19/02/2023</a:t>
             </a:fld>
             <a:endParaRPr lang="pt-BR"/>
           </a:p>
@@ -1828,7 +1829,7 @@
           <a:p>
             <a:fld id="{DF71B4F2-0B47-4901-AF64-36B0060F3536}" type="datetimeFigureOut">
               <a:rPr lang="pt-BR" smtClean="0"/>
-              <a:t>17/02/2023</a:t>
+              <a:t>19/02/2023</a:t>
             </a:fld>
             <a:endParaRPr lang="pt-BR"/>
           </a:p>
@@ -1969,7 +1970,7 @@
           <a:p>
             <a:fld id="{DF71B4F2-0B47-4901-AF64-36B0060F3536}" type="datetimeFigureOut">
               <a:rPr lang="pt-BR" smtClean="0"/>
-              <a:t>17/02/2023</a:t>
+              <a:t>19/02/2023</a:t>
             </a:fld>
             <a:endParaRPr lang="pt-BR"/>
           </a:p>
@@ -2082,7 +2083,7 @@
           <a:p>
             <a:fld id="{DF71B4F2-0B47-4901-AF64-36B0060F3536}" type="datetimeFigureOut">
               <a:rPr lang="pt-BR" smtClean="0"/>
-              <a:t>17/02/2023</a:t>
+              <a:t>19/02/2023</a:t>
             </a:fld>
             <a:endParaRPr lang="pt-BR"/>
           </a:p>
@@ -2393,7 +2394,7 @@
           <a:p>
             <a:fld id="{DF71B4F2-0B47-4901-AF64-36B0060F3536}" type="datetimeFigureOut">
               <a:rPr lang="pt-BR" smtClean="0"/>
-              <a:t>17/02/2023</a:t>
+              <a:t>19/02/2023</a:t>
             </a:fld>
             <a:endParaRPr lang="pt-BR"/>
           </a:p>
@@ -2681,7 +2682,7 @@
           <a:p>
             <a:fld id="{DF71B4F2-0B47-4901-AF64-36B0060F3536}" type="datetimeFigureOut">
               <a:rPr lang="pt-BR" smtClean="0"/>
-              <a:t>17/02/2023</a:t>
+              <a:t>19/02/2023</a:t>
             </a:fld>
             <a:endParaRPr lang="pt-BR"/>
           </a:p>
@@ -2922,7 +2923,7 @@
           <a:p>
             <a:fld id="{DF71B4F2-0B47-4901-AF64-36B0060F3536}" type="datetimeFigureOut">
               <a:rPr lang="pt-BR" smtClean="0"/>
-              <a:t>17/02/2023</a:t>
+              <a:t>19/02/2023</a:t>
             </a:fld>
             <a:endParaRPr lang="pt-BR"/>
           </a:p>
@@ -3423,7 +3424,7 @@
             <a:pPr algn="ctr"/>
             <a:r>
               <a:rPr lang="pt-BR" sz="3200" b="1" dirty="0" smtClean="0"/>
-              <a:t>Acompanhamento das Vendas</a:t>
+              <a:t>VENDAS - VOLUMETRIA</a:t>
             </a:r>
             <a:endParaRPr lang="pt-BR" sz="3200" b="1" dirty="0"/>
           </a:p>
@@ -3497,7 +3498,7 @@
         </p:nvSpPr>
         <p:spPr>
           <a:xfrm>
-            <a:off x="53790" y="1143002"/>
+            <a:off x="53790" y="1173600"/>
             <a:ext cx="3246971" cy="2743200"/>
           </a:xfrm>
           <a:prstGeom prst="roundRect">
@@ -3603,7 +3604,7 @@
         </p:nvSpPr>
         <p:spPr>
           <a:xfrm>
-            <a:off x="6669739" y="1143002"/>
+            <a:off x="6669739" y="1173600"/>
             <a:ext cx="3247200" cy="2743200"/>
           </a:xfrm>
           <a:prstGeom prst="roundRect">
@@ -3945,284 +3946,6 @@
           <a:p>
             <a:pPr algn="ctr"/>
             <a:endParaRPr lang="pt-BR" dirty="0"/>
-          </a:p>
-        </p:txBody>
-      </p:sp>
-      <p:sp>
-        <p:nvSpPr>
-          <p:cNvPr id="34" name="Retângulo 33">
-            <a:extLst>
-              <a:ext uri="{FF2B5EF4-FFF2-40B4-BE49-F238E27FC236}">
-                <a16:creationId xmlns:a16="http://schemas.microsoft.com/office/drawing/2014/main" id="{1CCC35B8-C50B-455B-9D8E-2207CAA37A9E}"/>
-              </a:ext>
-            </a:extLst>
-          </p:cNvPr>
-          <p:cNvSpPr/>
-          <p:nvPr/>
-        </p:nvSpPr>
-        <p:spPr>
-          <a:xfrm>
-            <a:off x="616566" y="903907"/>
-            <a:ext cx="2371164" cy="45719"/>
-          </a:xfrm>
-          <a:prstGeom prst="rect">
-            <a:avLst/>
-          </a:prstGeom>
-          <a:noFill/>
-          <a:ln>
-            <a:noFill/>
-          </a:ln>
-        </p:spPr>
-        <p:style>
-          <a:lnRef idx="2">
-            <a:schemeClr val="accent1">
-              <a:shade val="50000"/>
-            </a:schemeClr>
-          </a:lnRef>
-          <a:fillRef idx="1">
-            <a:schemeClr val="accent1"/>
-          </a:fillRef>
-          <a:effectRef idx="0">
-            <a:schemeClr val="accent1"/>
-          </a:effectRef>
-          <a:fontRef idx="minor">
-            <a:schemeClr val="lt1"/>
-          </a:fontRef>
-        </p:style>
-        <p:txBody>
-          <a:bodyPr rtlCol="0" anchor="ctr"/>
-          <a:lstStyle/>
-          <a:p>
-            <a:pPr algn="ctr"/>
-            <a:r>
-              <a:rPr lang="pt-BR" sz="1900" b="1" dirty="0" smtClean="0"/>
-              <a:t>Vendas x Região</a:t>
-            </a:r>
-            <a:endParaRPr lang="pt-BR" sz="1900" b="1" dirty="0"/>
-          </a:p>
-        </p:txBody>
-      </p:sp>
-      <p:sp>
-        <p:nvSpPr>
-          <p:cNvPr id="35" name="Retângulo 34">
-            <a:extLst>
-              <a:ext uri="{FF2B5EF4-FFF2-40B4-BE49-F238E27FC236}">
-                <a16:creationId xmlns:a16="http://schemas.microsoft.com/office/drawing/2014/main" id="{B627BB4A-E4FE-4BBA-8B69-427D938454E5}"/>
-              </a:ext>
-            </a:extLst>
-          </p:cNvPr>
-          <p:cNvSpPr/>
-          <p:nvPr/>
-        </p:nvSpPr>
-        <p:spPr>
-          <a:xfrm>
-            <a:off x="7068034" y="903907"/>
-            <a:ext cx="2372400" cy="46800"/>
-          </a:xfrm>
-          <a:prstGeom prst="rect">
-            <a:avLst/>
-          </a:prstGeom>
-          <a:noFill/>
-          <a:ln>
-            <a:noFill/>
-          </a:ln>
-        </p:spPr>
-        <p:style>
-          <a:lnRef idx="2">
-            <a:schemeClr val="accent1">
-              <a:shade val="50000"/>
-            </a:schemeClr>
-          </a:lnRef>
-          <a:fillRef idx="1">
-            <a:schemeClr val="accent1"/>
-          </a:fillRef>
-          <a:effectRef idx="0">
-            <a:schemeClr val="accent1"/>
-          </a:effectRef>
-          <a:fontRef idx="minor">
-            <a:schemeClr val="lt1"/>
-          </a:fontRef>
-        </p:style>
-        <p:txBody>
-          <a:bodyPr rtlCol="0" anchor="ctr"/>
-          <a:lstStyle/>
-          <a:p>
-            <a:pPr algn="ctr"/>
-            <a:r>
-              <a:rPr lang="pt-BR" sz="1900" b="1" dirty="0" smtClean="0"/>
-              <a:t>Vendas </a:t>
-            </a:r>
-            <a:r>
-              <a:rPr lang="pt-BR" sz="1900" b="1" dirty="0"/>
-              <a:t>x</a:t>
-            </a:r>
-            <a:r>
-              <a:rPr lang="pt-BR" sz="1900" b="1" dirty="0" smtClean="0"/>
-              <a:t> Produto</a:t>
-            </a:r>
-            <a:endParaRPr lang="pt-BR" sz="1900" b="1" dirty="0"/>
-          </a:p>
-        </p:txBody>
-      </p:sp>
-      <p:sp>
-        <p:nvSpPr>
-          <p:cNvPr id="36" name="Retângulo 35">
-            <a:extLst>
-              <a:ext uri="{FF2B5EF4-FFF2-40B4-BE49-F238E27FC236}">
-                <a16:creationId xmlns:a16="http://schemas.microsoft.com/office/drawing/2014/main" id="{FE2308CD-15F3-4BB3-A677-D8938E93E259}"/>
-              </a:ext>
-            </a:extLst>
-          </p:cNvPr>
-          <p:cNvSpPr/>
-          <p:nvPr/>
-        </p:nvSpPr>
-        <p:spPr>
-          <a:xfrm>
-            <a:off x="3890111" y="916671"/>
-            <a:ext cx="2372400" cy="46800"/>
-          </a:xfrm>
-          <a:prstGeom prst="rect">
-            <a:avLst/>
-          </a:prstGeom>
-          <a:noFill/>
-          <a:ln>
-            <a:noFill/>
-          </a:ln>
-        </p:spPr>
-        <p:style>
-          <a:lnRef idx="2">
-            <a:schemeClr val="accent1">
-              <a:shade val="50000"/>
-            </a:schemeClr>
-          </a:lnRef>
-          <a:fillRef idx="1">
-            <a:schemeClr val="accent1"/>
-          </a:fillRef>
-          <a:effectRef idx="0">
-            <a:schemeClr val="accent1"/>
-          </a:effectRef>
-          <a:fontRef idx="minor">
-            <a:schemeClr val="lt1"/>
-          </a:fontRef>
-        </p:style>
-        <p:txBody>
-          <a:bodyPr rtlCol="0" anchor="ctr"/>
-          <a:lstStyle/>
-          <a:p>
-            <a:pPr algn="ctr"/>
-            <a:r>
-              <a:rPr lang="pt-BR" sz="1900" b="1" dirty="0" smtClean="0"/>
-              <a:t>Vendas x Ano</a:t>
-            </a:r>
-            <a:endParaRPr lang="pt-BR" sz="1900" b="1" dirty="0"/>
-          </a:p>
-        </p:txBody>
-      </p:sp>
-      <p:sp>
-        <p:nvSpPr>
-          <p:cNvPr id="37" name="Retângulo 36">
-            <a:extLst>
-              <a:ext uri="{FF2B5EF4-FFF2-40B4-BE49-F238E27FC236}">
-                <a16:creationId xmlns:a16="http://schemas.microsoft.com/office/drawing/2014/main" id="{6936AB2B-1005-471C-9DCC-851F13D11205}"/>
-              </a:ext>
-            </a:extLst>
-          </p:cNvPr>
-          <p:cNvSpPr/>
-          <p:nvPr/>
-        </p:nvSpPr>
-        <p:spPr>
-          <a:xfrm>
-            <a:off x="100562" y="4077062"/>
-            <a:ext cx="3206354" cy="176348"/>
-          </a:xfrm>
-          <a:prstGeom prst="rect">
-            <a:avLst/>
-          </a:prstGeom>
-          <a:noFill/>
-          <a:ln>
-            <a:noFill/>
-          </a:ln>
-        </p:spPr>
-        <p:style>
-          <a:lnRef idx="2">
-            <a:schemeClr val="accent1">
-              <a:shade val="50000"/>
-            </a:schemeClr>
-          </a:lnRef>
-          <a:fillRef idx="1">
-            <a:schemeClr val="accent1"/>
-          </a:fillRef>
-          <a:effectRef idx="0">
-            <a:schemeClr val="accent1"/>
-          </a:effectRef>
-          <a:fontRef idx="minor">
-            <a:schemeClr val="lt1"/>
-          </a:fontRef>
-        </p:style>
-        <p:txBody>
-          <a:bodyPr rtlCol="0" anchor="ctr"/>
-          <a:lstStyle/>
-          <a:p>
-            <a:pPr algn="ctr"/>
-            <a:r>
-              <a:rPr lang="pt-BR" sz="1900" b="1" dirty="0" smtClean="0"/>
-              <a:t>Vendas x Categoria</a:t>
-            </a:r>
-            <a:endParaRPr lang="pt-BR" sz="1900" b="1" dirty="0"/>
-          </a:p>
-        </p:txBody>
-      </p:sp>
-      <p:sp>
-        <p:nvSpPr>
-          <p:cNvPr id="38" name="Retângulo 37">
-            <a:extLst>
-              <a:ext uri="{FF2B5EF4-FFF2-40B4-BE49-F238E27FC236}">
-                <a16:creationId xmlns:a16="http://schemas.microsoft.com/office/drawing/2014/main" id="{F85B8093-7AB6-4A8C-A1DC-F658FDB9DBD3}"/>
-              </a:ext>
-            </a:extLst>
-          </p:cNvPr>
-          <p:cNvSpPr/>
-          <p:nvPr/>
-        </p:nvSpPr>
-        <p:spPr>
-          <a:xfrm>
-            <a:off x="5945577" y="3974678"/>
-            <a:ext cx="3623029" cy="377624"/>
-          </a:xfrm>
-          <a:prstGeom prst="rect">
-            <a:avLst/>
-          </a:prstGeom>
-          <a:noFill/>
-          <a:ln>
-            <a:noFill/>
-          </a:ln>
-        </p:spPr>
-        <p:style>
-          <a:lnRef idx="2">
-            <a:schemeClr val="accent1">
-              <a:shade val="50000"/>
-            </a:schemeClr>
-          </a:lnRef>
-          <a:fillRef idx="1">
-            <a:schemeClr val="accent1"/>
-          </a:fillRef>
-          <a:effectRef idx="0">
-            <a:schemeClr val="accent1"/>
-          </a:effectRef>
-          <a:fontRef idx="minor">
-            <a:schemeClr val="lt1"/>
-          </a:fontRef>
-        </p:style>
-        <p:txBody>
-          <a:bodyPr rtlCol="0" anchor="ctr"/>
-          <a:lstStyle/>
-          <a:p>
-            <a:pPr algn="ctr"/>
-            <a:r>
-              <a:rPr lang="pt-BR" sz="1900" b="1" dirty="0" smtClean="0"/>
-              <a:t>Vendas x Cidade</a:t>
-            </a:r>
-            <a:endParaRPr lang="pt-BR" sz="1900" b="1" dirty="0"/>
           </a:p>
         </p:txBody>
       </p:sp>
@@ -4537,6 +4260,946 @@
 </file>
 
 <file path=ppt/slides/slide2.xml><?xml version="1.0" encoding="utf-8"?>
+<p:sld xmlns:a="http://schemas.openxmlformats.org/drawingml/2006/main" xmlns:r="http://schemas.openxmlformats.org/officeDocument/2006/relationships" xmlns:p="http://schemas.openxmlformats.org/presentationml/2006/main">
+  <p:cSld>
+    <p:spTree>
+      <p:nvGrpSpPr>
+        <p:cNvPr id="1" name=""/>
+        <p:cNvGrpSpPr/>
+        <p:nvPr/>
+      </p:nvGrpSpPr>
+      <p:grpSpPr>
+        <a:xfrm>
+          <a:off x="0" y="0"/>
+          <a:ext cx="0" cy="0"/>
+          <a:chOff x="0" y="0"/>
+          <a:chExt cx="0" cy="0"/>
+        </a:xfrm>
+      </p:grpSpPr>
+      <p:sp>
+        <p:nvSpPr>
+          <p:cNvPr id="2" name="Título 1">
+            <a:extLst>
+              <a:ext uri="{FF2B5EF4-FFF2-40B4-BE49-F238E27FC236}">
+                <a16:creationId xmlns:a16="http://schemas.microsoft.com/office/drawing/2014/main" id="{AD9C279B-4195-41F5-A23C-96D7AE6BD02A}"/>
+              </a:ext>
+            </a:extLst>
+          </p:cNvPr>
+          <p:cNvSpPr>
+            <a:spLocks noGrp="1"/>
+          </p:cNvSpPr>
+          <p:nvPr>
+            <p:ph type="ctrTitle"/>
+          </p:nvPr>
+        </p:nvSpPr>
+        <p:spPr>
+          <a:xfrm>
+            <a:off x="0" y="0"/>
+            <a:ext cx="12192000" cy="6965576"/>
+          </a:xfrm>
+          <a:solidFill>
+            <a:schemeClr val="tx1">
+              <a:lumMod val="85000"/>
+              <a:lumOff val="15000"/>
+            </a:schemeClr>
+          </a:solidFill>
+        </p:spPr>
+        <p:txBody>
+          <a:bodyPr/>
+          <a:lstStyle/>
+          <a:p>
+            <a:endParaRPr lang="pt-BR" dirty="0"/>
+          </a:p>
+        </p:txBody>
+      </p:sp>
+      <p:sp>
+        <p:nvSpPr>
+          <p:cNvPr id="5" name="Retângulo: Cantos Arredondados 4">
+            <a:extLst>
+              <a:ext uri="{FF2B5EF4-FFF2-40B4-BE49-F238E27FC236}">
+                <a16:creationId xmlns:a16="http://schemas.microsoft.com/office/drawing/2014/main" id="{C4AC5EDC-8903-4383-A51F-6EF88D9F5C09}"/>
+              </a:ext>
+            </a:extLst>
+          </p:cNvPr>
+          <p:cNvSpPr/>
+          <p:nvPr/>
+        </p:nvSpPr>
+        <p:spPr>
+          <a:xfrm>
+            <a:off x="2685709" y="2592"/>
+            <a:ext cx="5918870" cy="632012"/>
+          </a:xfrm>
+          <a:prstGeom prst="roundRect">
+            <a:avLst/>
+          </a:prstGeom>
+          <a:noFill/>
+          <a:ln>
+            <a:noFill/>
+          </a:ln>
+        </p:spPr>
+        <p:style>
+          <a:lnRef idx="2">
+            <a:schemeClr val="dk1">
+              <a:shade val="50000"/>
+            </a:schemeClr>
+          </a:lnRef>
+          <a:fillRef idx="1">
+            <a:schemeClr val="dk1"/>
+          </a:fillRef>
+          <a:effectRef idx="0">
+            <a:schemeClr val="dk1"/>
+          </a:effectRef>
+          <a:fontRef idx="minor">
+            <a:schemeClr val="lt1"/>
+          </a:fontRef>
+        </p:style>
+        <p:txBody>
+          <a:bodyPr rtlCol="0" anchor="ctr"/>
+          <a:lstStyle/>
+          <a:p>
+            <a:pPr algn="ctr"/>
+            <a:r>
+              <a:rPr lang="pt-BR" sz="3200" b="1" dirty="0"/>
+              <a:t>VENDAS - </a:t>
+            </a:r>
+            <a:r>
+              <a:rPr lang="pt-BR" sz="3200" b="1" dirty="0" smtClean="0"/>
+              <a:t>FATURAMENTO</a:t>
+            </a:r>
+            <a:endParaRPr lang="pt-BR" sz="3200" b="1" dirty="0"/>
+          </a:p>
+        </p:txBody>
+      </p:sp>
+      <p:sp>
+        <p:nvSpPr>
+          <p:cNvPr id="6" name="Retângulo: Cantos Arredondados 5">
+            <a:extLst>
+              <a:ext uri="{FF2B5EF4-FFF2-40B4-BE49-F238E27FC236}">
+                <a16:creationId xmlns:a16="http://schemas.microsoft.com/office/drawing/2014/main" id="{8B2F3C4F-CE1F-4C8A-8E47-4ED9E593C966}"/>
+              </a:ext>
+            </a:extLst>
+          </p:cNvPr>
+          <p:cNvSpPr/>
+          <p:nvPr/>
+        </p:nvSpPr>
+        <p:spPr>
+          <a:xfrm>
+            <a:off x="10344424" y="27589"/>
+            <a:ext cx="1082154" cy="349625"/>
+          </a:xfrm>
+          <a:prstGeom prst="roundRect">
+            <a:avLst/>
+          </a:prstGeom>
+          <a:noFill/>
+          <a:ln>
+            <a:noFill/>
+          </a:ln>
+        </p:spPr>
+        <p:style>
+          <a:lnRef idx="2">
+            <a:schemeClr val="dk1">
+              <a:shade val="50000"/>
+            </a:schemeClr>
+          </a:lnRef>
+          <a:fillRef idx="1">
+            <a:schemeClr val="dk1"/>
+          </a:fillRef>
+          <a:effectRef idx="0">
+            <a:schemeClr val="dk1"/>
+          </a:effectRef>
+          <a:fontRef idx="minor">
+            <a:schemeClr val="lt1"/>
+          </a:fontRef>
+        </p:style>
+        <p:txBody>
+          <a:bodyPr rtlCol="0" anchor="ctr"/>
+          <a:lstStyle/>
+          <a:p>
+            <a:pPr algn="ctr"/>
+            <a:r>
+              <a:rPr lang="pt-BR" sz="1900" b="1" dirty="0" smtClean="0"/>
+              <a:t>Período</a:t>
+            </a:r>
+            <a:endParaRPr lang="pt-BR" sz="1900" b="1" dirty="0"/>
+          </a:p>
+        </p:txBody>
+      </p:sp>
+      <p:sp>
+        <p:nvSpPr>
+          <p:cNvPr id="14" name="Retângulo: Cantos Arredondados 13">
+            <a:extLst>
+              <a:ext uri="{FF2B5EF4-FFF2-40B4-BE49-F238E27FC236}">
+                <a16:creationId xmlns:a16="http://schemas.microsoft.com/office/drawing/2014/main" id="{D96D0C50-7F6C-49EA-8928-B0456E87E86D}"/>
+              </a:ext>
+            </a:extLst>
+          </p:cNvPr>
+          <p:cNvSpPr/>
+          <p:nvPr/>
+        </p:nvSpPr>
+        <p:spPr>
+          <a:xfrm>
+            <a:off x="53790" y="1173600"/>
+            <a:ext cx="3246971" cy="2743200"/>
+          </a:xfrm>
+          <a:prstGeom prst="roundRect">
+            <a:avLst/>
+          </a:prstGeom>
+          <a:solidFill>
+            <a:schemeClr val="tx1">
+              <a:lumMod val="75000"/>
+              <a:lumOff val="25000"/>
+            </a:schemeClr>
+          </a:solidFill>
+          <a:effectLst/>
+        </p:spPr>
+        <p:style>
+          <a:lnRef idx="2">
+            <a:schemeClr val="accent1">
+              <a:shade val="50000"/>
+            </a:schemeClr>
+          </a:lnRef>
+          <a:fillRef idx="1">
+            <a:schemeClr val="accent1"/>
+          </a:fillRef>
+          <a:effectRef idx="0">
+            <a:schemeClr val="accent1"/>
+          </a:effectRef>
+          <a:fontRef idx="minor">
+            <a:schemeClr val="lt1"/>
+          </a:fontRef>
+        </p:style>
+        <p:txBody>
+          <a:bodyPr rtlCol="0" anchor="ctr"/>
+          <a:lstStyle/>
+          <a:p>
+            <a:pPr algn="ctr"/>
+            <a:endParaRPr lang="pt-BR" dirty="0"/>
+          </a:p>
+        </p:txBody>
+      </p:sp>
+      <p:sp>
+        <p:nvSpPr>
+          <p:cNvPr id="17" name="Retângulo: Cantos Arredondados 16">
+            <a:extLst>
+              <a:ext uri="{FF2B5EF4-FFF2-40B4-BE49-F238E27FC236}">
+                <a16:creationId xmlns:a16="http://schemas.microsoft.com/office/drawing/2014/main" id="{343D470A-31BD-4D6F-9260-BF08D2A0B541}"/>
+              </a:ext>
+            </a:extLst>
+          </p:cNvPr>
+          <p:cNvSpPr/>
+          <p:nvPr/>
+        </p:nvSpPr>
+        <p:spPr>
+          <a:xfrm>
+            <a:off x="3356160" y="1173258"/>
+            <a:ext cx="3247200" cy="2743200"/>
+          </a:xfrm>
+          <a:prstGeom prst="roundRect">
+            <a:avLst/>
+          </a:prstGeom>
+          <a:solidFill>
+            <a:schemeClr val="tx1">
+              <a:lumMod val="75000"/>
+              <a:lumOff val="25000"/>
+            </a:schemeClr>
+          </a:solidFill>
+          <a:effectLst/>
+        </p:spPr>
+        <p:style>
+          <a:lnRef idx="2">
+            <a:schemeClr val="accent1">
+              <a:shade val="50000"/>
+            </a:schemeClr>
+          </a:lnRef>
+          <a:fillRef idx="1">
+            <a:schemeClr val="accent1"/>
+          </a:fillRef>
+          <a:effectRef idx="0">
+            <a:schemeClr val="accent1"/>
+          </a:effectRef>
+          <a:fontRef idx="minor">
+            <a:schemeClr val="lt1"/>
+          </a:fontRef>
+        </p:style>
+        <p:txBody>
+          <a:bodyPr rtlCol="0" anchor="ctr"/>
+          <a:lstStyle/>
+          <a:p>
+            <a:pPr algn="ctr"/>
+            <a:endParaRPr lang="pt-BR"/>
+          </a:p>
+        </p:txBody>
+      </p:sp>
+      <p:sp>
+        <p:nvSpPr>
+          <p:cNvPr id="18" name="Retângulo: Cantos Arredondados 17">
+            <a:extLst>
+              <a:ext uri="{FF2B5EF4-FFF2-40B4-BE49-F238E27FC236}">
+                <a16:creationId xmlns:a16="http://schemas.microsoft.com/office/drawing/2014/main" id="{DE8BBBEF-A3AC-4B35-B080-66A0FD9FFB12}"/>
+              </a:ext>
+            </a:extLst>
+          </p:cNvPr>
+          <p:cNvSpPr/>
+          <p:nvPr/>
+        </p:nvSpPr>
+        <p:spPr>
+          <a:xfrm>
+            <a:off x="6669739" y="1173600"/>
+            <a:ext cx="3247200" cy="2743200"/>
+          </a:xfrm>
+          <a:prstGeom prst="roundRect">
+            <a:avLst/>
+          </a:prstGeom>
+          <a:solidFill>
+            <a:schemeClr val="tx1">
+              <a:lumMod val="75000"/>
+              <a:lumOff val="25000"/>
+            </a:schemeClr>
+          </a:solidFill>
+          <a:effectLst/>
+        </p:spPr>
+        <p:style>
+          <a:lnRef idx="2">
+            <a:schemeClr val="accent1">
+              <a:shade val="50000"/>
+            </a:schemeClr>
+          </a:lnRef>
+          <a:fillRef idx="1">
+            <a:schemeClr val="accent1"/>
+          </a:fillRef>
+          <a:effectRef idx="0">
+            <a:schemeClr val="accent1"/>
+          </a:effectRef>
+          <a:fontRef idx="minor">
+            <a:schemeClr val="lt1"/>
+          </a:fontRef>
+        </p:style>
+        <p:txBody>
+          <a:bodyPr rtlCol="0" anchor="ctr"/>
+          <a:lstStyle/>
+          <a:p>
+            <a:pPr algn="ctr"/>
+            <a:endParaRPr lang="pt-BR"/>
+          </a:p>
+        </p:txBody>
+      </p:sp>
+      <p:sp>
+        <p:nvSpPr>
+          <p:cNvPr id="20" name="Retângulo: Cantos Arredondados 19">
+            <a:extLst>
+              <a:ext uri="{FF2B5EF4-FFF2-40B4-BE49-F238E27FC236}">
+                <a16:creationId xmlns:a16="http://schemas.microsoft.com/office/drawing/2014/main" id="{24649549-E590-4B46-836D-83576CF88AAC}"/>
+              </a:ext>
+            </a:extLst>
+          </p:cNvPr>
+          <p:cNvSpPr/>
+          <p:nvPr/>
+        </p:nvSpPr>
+        <p:spPr>
+          <a:xfrm>
+            <a:off x="53790" y="4037929"/>
+            <a:ext cx="3246972" cy="2850776"/>
+          </a:xfrm>
+          <a:prstGeom prst="roundRect">
+            <a:avLst/>
+          </a:prstGeom>
+          <a:solidFill>
+            <a:schemeClr val="tx1">
+              <a:lumMod val="75000"/>
+              <a:lumOff val="25000"/>
+            </a:schemeClr>
+          </a:solidFill>
+          <a:effectLst/>
+        </p:spPr>
+        <p:style>
+          <a:lnRef idx="2">
+            <a:schemeClr val="accent1">
+              <a:shade val="50000"/>
+            </a:schemeClr>
+          </a:lnRef>
+          <a:fillRef idx="1">
+            <a:schemeClr val="accent1"/>
+          </a:fillRef>
+          <a:effectRef idx="0">
+            <a:schemeClr val="accent1"/>
+          </a:effectRef>
+          <a:fontRef idx="minor">
+            <a:schemeClr val="lt1"/>
+          </a:fontRef>
+        </p:style>
+        <p:txBody>
+          <a:bodyPr rtlCol="0" anchor="ctr"/>
+          <a:lstStyle/>
+          <a:p>
+            <a:pPr algn="ctr"/>
+            <a:endParaRPr lang="pt-BR"/>
+          </a:p>
+        </p:txBody>
+      </p:sp>
+      <p:sp>
+        <p:nvSpPr>
+          <p:cNvPr id="21" name="Retângulo: Cantos Arredondados 20">
+            <a:extLst>
+              <a:ext uri="{FF2B5EF4-FFF2-40B4-BE49-F238E27FC236}">
+                <a16:creationId xmlns:a16="http://schemas.microsoft.com/office/drawing/2014/main" id="{763EB752-DBBC-4F84-A684-BDA70843439C}"/>
+              </a:ext>
+            </a:extLst>
+          </p:cNvPr>
+          <p:cNvSpPr/>
+          <p:nvPr/>
+        </p:nvSpPr>
+        <p:spPr>
+          <a:xfrm>
+            <a:off x="3354552" y="4037929"/>
+            <a:ext cx="8781591" cy="2850776"/>
+          </a:xfrm>
+          <a:prstGeom prst="roundRect">
+            <a:avLst/>
+          </a:prstGeom>
+          <a:solidFill>
+            <a:schemeClr val="tx1">
+              <a:lumMod val="75000"/>
+              <a:lumOff val="25000"/>
+            </a:schemeClr>
+          </a:solidFill>
+          <a:effectLst/>
+        </p:spPr>
+        <p:style>
+          <a:lnRef idx="2">
+            <a:schemeClr val="accent1">
+              <a:shade val="50000"/>
+            </a:schemeClr>
+          </a:lnRef>
+          <a:fillRef idx="1">
+            <a:schemeClr val="accent1"/>
+          </a:fillRef>
+          <a:effectRef idx="0">
+            <a:schemeClr val="accent1"/>
+          </a:effectRef>
+          <a:fontRef idx="minor">
+            <a:schemeClr val="lt1"/>
+          </a:fontRef>
+        </p:style>
+        <p:txBody>
+          <a:bodyPr rtlCol="0" anchor="ctr"/>
+          <a:lstStyle/>
+          <a:p>
+            <a:pPr algn="ctr"/>
+            <a:endParaRPr lang="pt-BR"/>
+          </a:p>
+        </p:txBody>
+      </p:sp>
+      <p:sp>
+        <p:nvSpPr>
+          <p:cNvPr id="26" name="Retângulo: Cantos Arredondados 25">
+            <a:extLst>
+              <a:ext uri="{FF2B5EF4-FFF2-40B4-BE49-F238E27FC236}">
+                <a16:creationId xmlns:a16="http://schemas.microsoft.com/office/drawing/2014/main" id="{1A14266C-0F72-4259-9222-2412C86AB436}"/>
+              </a:ext>
+            </a:extLst>
+          </p:cNvPr>
+          <p:cNvSpPr/>
+          <p:nvPr/>
+        </p:nvSpPr>
+        <p:spPr>
+          <a:xfrm>
+            <a:off x="10057776" y="1555885"/>
+            <a:ext cx="958078" cy="911629"/>
+          </a:xfrm>
+          <a:prstGeom prst="roundRect">
+            <a:avLst/>
+          </a:prstGeom>
+          <a:solidFill>
+            <a:srgbClr val="0070C0"/>
+          </a:solidFill>
+          <a:effectLst/>
+        </p:spPr>
+        <p:style>
+          <a:lnRef idx="2">
+            <a:schemeClr val="accent1">
+              <a:shade val="50000"/>
+            </a:schemeClr>
+          </a:lnRef>
+          <a:fillRef idx="1">
+            <a:schemeClr val="accent1"/>
+          </a:fillRef>
+          <a:effectRef idx="0">
+            <a:schemeClr val="accent1"/>
+          </a:effectRef>
+          <a:fontRef idx="minor">
+            <a:schemeClr val="lt1"/>
+          </a:fontRef>
+        </p:style>
+        <p:txBody>
+          <a:bodyPr rtlCol="0" anchor="ctr"/>
+          <a:lstStyle/>
+          <a:p>
+            <a:pPr algn="ctr"/>
+            <a:endParaRPr lang="pt-BR" dirty="0"/>
+          </a:p>
+        </p:txBody>
+      </p:sp>
+      <p:sp>
+        <p:nvSpPr>
+          <p:cNvPr id="28" name="Retângulo: Cantos Arredondados 27">
+            <a:extLst>
+              <a:ext uri="{FF2B5EF4-FFF2-40B4-BE49-F238E27FC236}">
+                <a16:creationId xmlns:a16="http://schemas.microsoft.com/office/drawing/2014/main" id="{0F148012-8A08-4A47-9C91-DEBD623BBD39}"/>
+              </a:ext>
+            </a:extLst>
+          </p:cNvPr>
+          <p:cNvSpPr/>
+          <p:nvPr/>
+        </p:nvSpPr>
+        <p:spPr>
+          <a:xfrm>
+            <a:off x="11164387" y="1555885"/>
+            <a:ext cx="958078" cy="910800"/>
+          </a:xfrm>
+          <a:prstGeom prst="roundRect">
+            <a:avLst/>
+          </a:prstGeom>
+          <a:solidFill>
+            <a:schemeClr val="accent6"/>
+          </a:solidFill>
+          <a:effectLst/>
+        </p:spPr>
+        <p:style>
+          <a:lnRef idx="2">
+            <a:schemeClr val="accent1">
+              <a:shade val="50000"/>
+            </a:schemeClr>
+          </a:lnRef>
+          <a:fillRef idx="1">
+            <a:schemeClr val="accent1"/>
+          </a:fillRef>
+          <a:effectRef idx="0">
+            <a:schemeClr val="accent1"/>
+          </a:effectRef>
+          <a:fontRef idx="minor">
+            <a:schemeClr val="lt1"/>
+          </a:fontRef>
+        </p:style>
+        <p:txBody>
+          <a:bodyPr rtlCol="0" anchor="ctr"/>
+          <a:lstStyle/>
+          <a:p>
+            <a:pPr algn="ctr"/>
+            <a:endParaRPr lang="pt-BR" dirty="0"/>
+          </a:p>
+        </p:txBody>
+      </p:sp>
+      <p:sp>
+        <p:nvSpPr>
+          <p:cNvPr id="30" name="Retângulo: Cantos Arredondados 29">
+            <a:extLst>
+              <a:ext uri="{FF2B5EF4-FFF2-40B4-BE49-F238E27FC236}">
+                <a16:creationId xmlns:a16="http://schemas.microsoft.com/office/drawing/2014/main" id="{EB75F44D-F38F-4E65-86BF-EA8A0C220E0F}"/>
+              </a:ext>
+            </a:extLst>
+          </p:cNvPr>
+          <p:cNvSpPr/>
+          <p:nvPr/>
+        </p:nvSpPr>
+        <p:spPr>
+          <a:xfrm>
+            <a:off x="10057776" y="2986648"/>
+            <a:ext cx="958078" cy="910800"/>
+          </a:xfrm>
+          <a:prstGeom prst="roundRect">
+            <a:avLst/>
+          </a:prstGeom>
+          <a:solidFill>
+            <a:schemeClr val="accent2"/>
+          </a:solidFill>
+          <a:effectLst/>
+        </p:spPr>
+        <p:style>
+          <a:lnRef idx="2">
+            <a:schemeClr val="accent1">
+              <a:shade val="50000"/>
+            </a:schemeClr>
+          </a:lnRef>
+          <a:fillRef idx="1">
+            <a:schemeClr val="accent1"/>
+          </a:fillRef>
+          <a:effectRef idx="0">
+            <a:schemeClr val="accent1"/>
+          </a:effectRef>
+          <a:fontRef idx="minor">
+            <a:schemeClr val="lt1"/>
+          </a:fontRef>
+        </p:style>
+        <p:txBody>
+          <a:bodyPr rtlCol="0" anchor="ctr"/>
+          <a:lstStyle/>
+          <a:p>
+            <a:pPr algn="ctr"/>
+            <a:endParaRPr lang="pt-BR" dirty="0"/>
+          </a:p>
+        </p:txBody>
+      </p:sp>
+      <p:sp>
+        <p:nvSpPr>
+          <p:cNvPr id="31" name="Retângulo: Cantos Arredondados 30">
+            <a:extLst>
+              <a:ext uri="{FF2B5EF4-FFF2-40B4-BE49-F238E27FC236}">
+                <a16:creationId xmlns:a16="http://schemas.microsoft.com/office/drawing/2014/main" id="{F53ECC20-4173-4BA8-901F-BB817185A11C}"/>
+              </a:ext>
+            </a:extLst>
+          </p:cNvPr>
+          <p:cNvSpPr/>
+          <p:nvPr/>
+        </p:nvSpPr>
+        <p:spPr>
+          <a:xfrm>
+            <a:off x="11164387" y="2984138"/>
+            <a:ext cx="958078" cy="910800"/>
+          </a:xfrm>
+          <a:prstGeom prst="roundRect">
+            <a:avLst/>
+          </a:prstGeom>
+          <a:solidFill>
+            <a:srgbClr val="7030A0"/>
+          </a:solidFill>
+          <a:effectLst/>
+        </p:spPr>
+        <p:style>
+          <a:lnRef idx="2">
+            <a:schemeClr val="accent1">
+              <a:shade val="50000"/>
+            </a:schemeClr>
+          </a:lnRef>
+          <a:fillRef idx="1">
+            <a:schemeClr val="accent1"/>
+          </a:fillRef>
+          <a:effectRef idx="0">
+            <a:schemeClr val="accent1"/>
+          </a:effectRef>
+          <a:fontRef idx="minor">
+            <a:schemeClr val="lt1"/>
+          </a:fontRef>
+        </p:style>
+        <p:txBody>
+          <a:bodyPr rtlCol="0" anchor="ctr"/>
+          <a:lstStyle/>
+          <a:p>
+            <a:pPr algn="ctr"/>
+            <a:endParaRPr lang="pt-BR" dirty="0"/>
+          </a:p>
+        </p:txBody>
+      </p:sp>
+      <p:sp>
+        <p:nvSpPr>
+          <p:cNvPr id="39" name="Retângulo 38">
+            <a:extLst>
+              <a:ext uri="{FF2B5EF4-FFF2-40B4-BE49-F238E27FC236}">
+                <a16:creationId xmlns:a16="http://schemas.microsoft.com/office/drawing/2014/main" id="{709EF3C2-883B-4B03-B246-EEFBCC751758}"/>
+              </a:ext>
+            </a:extLst>
+          </p:cNvPr>
+          <p:cNvSpPr/>
+          <p:nvPr/>
+        </p:nvSpPr>
+        <p:spPr>
+          <a:xfrm>
+            <a:off x="11096056" y="1086678"/>
+            <a:ext cx="1111727" cy="511010"/>
+          </a:xfrm>
+          <a:prstGeom prst="rect">
+            <a:avLst/>
+          </a:prstGeom>
+          <a:noFill/>
+          <a:ln>
+            <a:noFill/>
+          </a:ln>
+        </p:spPr>
+        <p:style>
+          <a:lnRef idx="2">
+            <a:schemeClr val="accent1">
+              <a:shade val="50000"/>
+            </a:schemeClr>
+          </a:lnRef>
+          <a:fillRef idx="1">
+            <a:schemeClr val="accent1"/>
+          </a:fillRef>
+          <a:effectRef idx="0">
+            <a:schemeClr val="accent1"/>
+          </a:effectRef>
+          <a:fontRef idx="minor">
+            <a:schemeClr val="lt1"/>
+          </a:fontRef>
+        </p:style>
+        <p:txBody>
+          <a:bodyPr rtlCol="0" anchor="ctr"/>
+          <a:lstStyle/>
+          <a:p>
+            <a:pPr algn="ctr"/>
+            <a:r>
+              <a:rPr lang="pt-BR" sz="1400" b="1" dirty="0" smtClean="0"/>
+              <a:t>Quantidade</a:t>
+            </a:r>
+          </a:p>
+          <a:p>
+            <a:pPr algn="ctr"/>
+            <a:r>
+              <a:rPr lang="pt-BR" sz="1400" b="1" dirty="0" smtClean="0"/>
+              <a:t>Clientes</a:t>
+            </a:r>
+            <a:endParaRPr lang="pt-BR" sz="1400" b="1" dirty="0"/>
+          </a:p>
+        </p:txBody>
+      </p:sp>
+      <p:sp>
+        <p:nvSpPr>
+          <p:cNvPr id="40" name="Retângulo 39">
+            <a:extLst>
+              <a:ext uri="{FF2B5EF4-FFF2-40B4-BE49-F238E27FC236}">
+                <a16:creationId xmlns:a16="http://schemas.microsoft.com/office/drawing/2014/main" id="{6AD89732-0E56-4023-8636-3C3345C806B2}"/>
+              </a:ext>
+            </a:extLst>
+          </p:cNvPr>
+          <p:cNvSpPr/>
+          <p:nvPr/>
+        </p:nvSpPr>
+        <p:spPr>
+          <a:xfrm>
+            <a:off x="10090115" y="1170563"/>
+            <a:ext cx="882689" cy="273702"/>
+          </a:xfrm>
+          <a:prstGeom prst="rect">
+            <a:avLst/>
+          </a:prstGeom>
+          <a:noFill/>
+          <a:ln>
+            <a:noFill/>
+          </a:ln>
+        </p:spPr>
+        <p:style>
+          <a:lnRef idx="2">
+            <a:schemeClr val="accent1">
+              <a:shade val="50000"/>
+            </a:schemeClr>
+          </a:lnRef>
+          <a:fillRef idx="1">
+            <a:schemeClr val="accent1"/>
+          </a:fillRef>
+          <a:effectRef idx="0">
+            <a:schemeClr val="accent1"/>
+          </a:effectRef>
+          <a:fontRef idx="minor">
+            <a:schemeClr val="lt1"/>
+          </a:fontRef>
+        </p:style>
+        <p:txBody>
+          <a:bodyPr rtlCol="0" anchor="ctr"/>
+          <a:lstStyle/>
+          <a:p>
+            <a:pPr algn="ctr"/>
+            <a:r>
+              <a:rPr lang="pt-BR" sz="1400" b="1" dirty="0" smtClean="0"/>
+              <a:t>Produtos </a:t>
+            </a:r>
+          </a:p>
+          <a:p>
+            <a:pPr algn="ctr"/>
+            <a:r>
+              <a:rPr lang="pt-BR" sz="1400" b="1" dirty="0" smtClean="0"/>
+              <a:t>Vendidos</a:t>
+            </a:r>
+            <a:endParaRPr lang="pt-BR" sz="1400" b="1" dirty="0"/>
+          </a:p>
+        </p:txBody>
+      </p:sp>
+      <p:sp>
+        <p:nvSpPr>
+          <p:cNvPr id="41" name="Retângulo 40">
+            <a:extLst>
+              <a:ext uri="{FF2B5EF4-FFF2-40B4-BE49-F238E27FC236}">
+                <a16:creationId xmlns:a16="http://schemas.microsoft.com/office/drawing/2014/main" id="{A53899D5-4527-4E6E-93A3-A7B0C12682ED}"/>
+              </a:ext>
+            </a:extLst>
+          </p:cNvPr>
+          <p:cNvSpPr/>
+          <p:nvPr/>
+        </p:nvSpPr>
+        <p:spPr>
+          <a:xfrm>
+            <a:off x="10027668" y="2490808"/>
+            <a:ext cx="1063661" cy="511010"/>
+          </a:xfrm>
+          <a:prstGeom prst="rect">
+            <a:avLst/>
+          </a:prstGeom>
+          <a:noFill/>
+          <a:ln>
+            <a:noFill/>
+          </a:ln>
+        </p:spPr>
+        <p:style>
+          <a:lnRef idx="2">
+            <a:schemeClr val="accent1">
+              <a:shade val="50000"/>
+            </a:schemeClr>
+          </a:lnRef>
+          <a:fillRef idx="1">
+            <a:schemeClr val="accent1"/>
+          </a:fillRef>
+          <a:effectRef idx="0">
+            <a:schemeClr val="accent1"/>
+          </a:effectRef>
+          <a:fontRef idx="minor">
+            <a:schemeClr val="lt1"/>
+          </a:fontRef>
+        </p:style>
+        <p:txBody>
+          <a:bodyPr rtlCol="0" anchor="ctr"/>
+          <a:lstStyle/>
+          <a:p>
+            <a:pPr algn="ctr"/>
+            <a:r>
+              <a:rPr lang="pt-BR" sz="1400" b="1" dirty="0" smtClean="0"/>
+              <a:t>Quantidade </a:t>
+            </a:r>
+          </a:p>
+          <a:p>
+            <a:pPr algn="ctr"/>
+            <a:r>
+              <a:rPr lang="pt-BR" sz="1400" b="1" dirty="0" smtClean="0"/>
+              <a:t>Cidades</a:t>
+            </a:r>
+            <a:endParaRPr lang="pt-BR" sz="1400" b="1" dirty="0"/>
+          </a:p>
+        </p:txBody>
+      </p:sp>
+      <p:sp>
+        <p:nvSpPr>
+          <p:cNvPr id="42" name="Retângulo 41">
+            <a:extLst>
+              <a:ext uri="{FF2B5EF4-FFF2-40B4-BE49-F238E27FC236}">
+                <a16:creationId xmlns:a16="http://schemas.microsoft.com/office/drawing/2014/main" id="{0249DA05-7C4A-4F8C-9A02-A4FDBFBCBC3C}"/>
+              </a:ext>
+            </a:extLst>
+          </p:cNvPr>
+          <p:cNvSpPr/>
+          <p:nvPr/>
+        </p:nvSpPr>
+        <p:spPr>
+          <a:xfrm>
+            <a:off x="11098291" y="2505149"/>
+            <a:ext cx="1066262" cy="511010"/>
+          </a:xfrm>
+          <a:prstGeom prst="rect">
+            <a:avLst/>
+          </a:prstGeom>
+          <a:noFill/>
+          <a:ln>
+            <a:noFill/>
+          </a:ln>
+        </p:spPr>
+        <p:style>
+          <a:lnRef idx="2">
+            <a:schemeClr val="accent1">
+              <a:shade val="50000"/>
+            </a:schemeClr>
+          </a:lnRef>
+          <a:fillRef idx="1">
+            <a:schemeClr val="accent1"/>
+          </a:fillRef>
+          <a:effectRef idx="0">
+            <a:schemeClr val="accent1"/>
+          </a:effectRef>
+          <a:fontRef idx="minor">
+            <a:schemeClr val="lt1"/>
+          </a:fontRef>
+        </p:style>
+        <p:txBody>
+          <a:bodyPr rtlCol="0" anchor="ctr"/>
+          <a:lstStyle/>
+          <a:p>
+            <a:pPr algn="ctr"/>
+            <a:r>
+              <a:rPr lang="pt-BR" sz="1400" b="1" dirty="0" smtClean="0"/>
+              <a:t>Quantidade</a:t>
+            </a:r>
+          </a:p>
+          <a:p>
+            <a:pPr algn="ctr"/>
+            <a:r>
+              <a:rPr lang="pt-BR" sz="1400" b="1" dirty="0" smtClean="0"/>
+              <a:t>Marcas</a:t>
+            </a:r>
+            <a:endParaRPr lang="pt-BR" sz="1400" b="1" dirty="0"/>
+          </a:p>
+        </p:txBody>
+      </p:sp>
+      <p:sp>
+        <p:nvSpPr>
+          <p:cNvPr id="4" name="Botão de Ação: Ir para a Página Inicial 3">
+            <a:hlinkClick r:id="" action="ppaction://noaction" highlightClick="1"/>
+            <a:extLst>
+              <a:ext uri="{FF2B5EF4-FFF2-40B4-BE49-F238E27FC236}">
+                <a16:creationId xmlns:a16="http://schemas.microsoft.com/office/drawing/2014/main" id="{74D27D9F-3F48-4CEC-8E0C-D13AA5666BA4}"/>
+              </a:ext>
+            </a:extLst>
+          </p:cNvPr>
+          <p:cNvSpPr/>
+          <p:nvPr/>
+        </p:nvSpPr>
+        <p:spPr>
+          <a:xfrm>
+            <a:off x="203525" y="161361"/>
+            <a:ext cx="527995" cy="473244"/>
+          </a:xfrm>
+          <a:prstGeom prst="actionButtonHome">
+            <a:avLst/>
+          </a:prstGeom>
+          <a:solidFill>
+            <a:schemeClr val="tx1">
+              <a:lumMod val="65000"/>
+              <a:lumOff val="35000"/>
+            </a:schemeClr>
+          </a:solidFill>
+        </p:spPr>
+        <p:style>
+          <a:lnRef idx="2">
+            <a:schemeClr val="accent1">
+              <a:shade val="50000"/>
+            </a:schemeClr>
+          </a:lnRef>
+          <a:fillRef idx="1">
+            <a:schemeClr val="accent1"/>
+          </a:fillRef>
+          <a:effectRef idx="0">
+            <a:schemeClr val="accent1"/>
+          </a:effectRef>
+          <a:fontRef idx="minor">
+            <a:schemeClr val="lt1"/>
+          </a:fontRef>
+        </p:style>
+        <p:txBody>
+          <a:bodyPr rtlCol="0" anchor="ctr"/>
+          <a:lstStyle/>
+          <a:p>
+            <a:pPr algn="ctr"/>
+            <a:endParaRPr lang="pt-BR"/>
+          </a:p>
+        </p:txBody>
+      </p:sp>
+    </p:spTree>
+    <p:extLst>
+      <p:ext uri="{BB962C8B-B14F-4D97-AF65-F5344CB8AC3E}">
+        <p14:creationId xmlns:p14="http://schemas.microsoft.com/office/powerpoint/2010/main" val="1361774178"/>
+      </p:ext>
+    </p:extLst>
+  </p:cSld>
+  <p:clrMapOvr>
+    <a:masterClrMapping/>
+  </p:clrMapOvr>
+</p:sld>
+</file>
+
+<file path=ppt/slides/slide3.xml><?xml version="1.0" encoding="utf-8"?>
 <p:sld xmlns:a="http://schemas.openxmlformats.org/drawingml/2006/main" xmlns:r="http://schemas.openxmlformats.org/officeDocument/2006/relationships" xmlns:p="http://schemas.openxmlformats.org/presentationml/2006/main">
   <p:cSld>
     <p:spTree>

</xml_diff>

<commit_message>
Novas alterações no dashboard de faturamento e volumetria - atualização das cores
</commit_message>
<xml_diff>
--- a/Criação de Template.pptx
+++ b/Criação de Template.pptx
@@ -273,7 +273,7 @@
           <a:p>
             <a:fld id="{DF71B4F2-0B47-4901-AF64-36B0060F3536}" type="datetimeFigureOut">
               <a:rPr lang="pt-BR" smtClean="0"/>
-              <a:t>19/02/2023</a:t>
+              <a:t>21/02/2023</a:t>
             </a:fld>
             <a:endParaRPr lang="pt-BR"/>
           </a:p>
@@ -471,7 +471,7 @@
           <a:p>
             <a:fld id="{DF71B4F2-0B47-4901-AF64-36B0060F3536}" type="datetimeFigureOut">
               <a:rPr lang="pt-BR" smtClean="0"/>
-              <a:t>19/02/2023</a:t>
+              <a:t>21/02/2023</a:t>
             </a:fld>
             <a:endParaRPr lang="pt-BR"/>
           </a:p>
@@ -679,7 +679,7 @@
           <a:p>
             <a:fld id="{DF71B4F2-0B47-4901-AF64-36B0060F3536}" type="datetimeFigureOut">
               <a:rPr lang="pt-BR" smtClean="0"/>
-              <a:t>19/02/2023</a:t>
+              <a:t>21/02/2023</a:t>
             </a:fld>
             <a:endParaRPr lang="pt-BR"/>
           </a:p>
@@ -877,7 +877,7 @@
           <a:p>
             <a:fld id="{DF71B4F2-0B47-4901-AF64-36B0060F3536}" type="datetimeFigureOut">
               <a:rPr lang="pt-BR" smtClean="0"/>
-              <a:t>19/02/2023</a:t>
+              <a:t>21/02/2023</a:t>
             </a:fld>
             <a:endParaRPr lang="pt-BR"/>
           </a:p>
@@ -1152,7 +1152,7 @@
           <a:p>
             <a:fld id="{DF71B4F2-0B47-4901-AF64-36B0060F3536}" type="datetimeFigureOut">
               <a:rPr lang="pt-BR" smtClean="0"/>
-              <a:t>19/02/2023</a:t>
+              <a:t>21/02/2023</a:t>
             </a:fld>
             <a:endParaRPr lang="pt-BR"/>
           </a:p>
@@ -1417,7 +1417,7 @@
           <a:p>
             <a:fld id="{DF71B4F2-0B47-4901-AF64-36B0060F3536}" type="datetimeFigureOut">
               <a:rPr lang="pt-BR" smtClean="0"/>
-              <a:t>19/02/2023</a:t>
+              <a:t>21/02/2023</a:t>
             </a:fld>
             <a:endParaRPr lang="pt-BR"/>
           </a:p>
@@ -1829,7 +1829,7 @@
           <a:p>
             <a:fld id="{DF71B4F2-0B47-4901-AF64-36B0060F3536}" type="datetimeFigureOut">
               <a:rPr lang="pt-BR" smtClean="0"/>
-              <a:t>19/02/2023</a:t>
+              <a:t>21/02/2023</a:t>
             </a:fld>
             <a:endParaRPr lang="pt-BR"/>
           </a:p>
@@ -1970,7 +1970,7 @@
           <a:p>
             <a:fld id="{DF71B4F2-0B47-4901-AF64-36B0060F3536}" type="datetimeFigureOut">
               <a:rPr lang="pt-BR" smtClean="0"/>
-              <a:t>19/02/2023</a:t>
+              <a:t>21/02/2023</a:t>
             </a:fld>
             <a:endParaRPr lang="pt-BR"/>
           </a:p>
@@ -2083,7 +2083,7 @@
           <a:p>
             <a:fld id="{DF71B4F2-0B47-4901-AF64-36B0060F3536}" type="datetimeFigureOut">
               <a:rPr lang="pt-BR" smtClean="0"/>
-              <a:t>19/02/2023</a:t>
+              <a:t>21/02/2023</a:t>
             </a:fld>
             <a:endParaRPr lang="pt-BR"/>
           </a:p>
@@ -2394,7 +2394,7 @@
           <a:p>
             <a:fld id="{DF71B4F2-0B47-4901-AF64-36B0060F3536}" type="datetimeFigureOut">
               <a:rPr lang="pt-BR" smtClean="0"/>
-              <a:t>19/02/2023</a:t>
+              <a:t>21/02/2023</a:t>
             </a:fld>
             <a:endParaRPr lang="pt-BR"/>
           </a:p>
@@ -2682,7 +2682,7 @@
           <a:p>
             <a:fld id="{DF71B4F2-0B47-4901-AF64-36B0060F3536}" type="datetimeFigureOut">
               <a:rPr lang="pt-BR" smtClean="0"/>
-              <a:t>19/02/2023</a:t>
+              <a:t>21/02/2023</a:t>
             </a:fld>
             <a:endParaRPr lang="pt-BR"/>
           </a:p>
@@ -2923,7 +2923,7 @@
           <a:p>
             <a:fld id="{DF71B4F2-0B47-4901-AF64-36B0060F3536}" type="datetimeFigureOut">
               <a:rPr lang="pt-BR" smtClean="0"/>
-              <a:t>19/02/2023</a:t>
+              <a:t>21/02/2023</a:t>
             </a:fld>
             <a:endParaRPr lang="pt-BR"/>
           </a:p>
@@ -3432,60 +3432,6 @@
       </p:sp>
       <p:sp>
         <p:nvSpPr>
-          <p:cNvPr id="6" name="Retângulo: Cantos Arredondados 5">
-            <a:extLst>
-              <a:ext uri="{FF2B5EF4-FFF2-40B4-BE49-F238E27FC236}">
-                <a16:creationId xmlns:a16="http://schemas.microsoft.com/office/drawing/2014/main" id="{8B2F3C4F-CE1F-4C8A-8E47-4ED9E593C966}"/>
-              </a:ext>
-            </a:extLst>
-          </p:cNvPr>
-          <p:cNvSpPr/>
-          <p:nvPr/>
-        </p:nvSpPr>
-        <p:spPr>
-          <a:xfrm>
-            <a:off x="10344424" y="27589"/>
-            <a:ext cx="1082154" cy="349625"/>
-          </a:xfrm>
-          <a:prstGeom prst="roundRect">
-            <a:avLst/>
-          </a:prstGeom>
-          <a:noFill/>
-          <a:ln>
-            <a:noFill/>
-          </a:ln>
-        </p:spPr>
-        <p:style>
-          <a:lnRef idx="2">
-            <a:schemeClr val="dk1">
-              <a:shade val="50000"/>
-            </a:schemeClr>
-          </a:lnRef>
-          <a:fillRef idx="1">
-            <a:schemeClr val="dk1"/>
-          </a:fillRef>
-          <a:effectRef idx="0">
-            <a:schemeClr val="dk1"/>
-          </a:effectRef>
-          <a:fontRef idx="minor">
-            <a:schemeClr val="lt1"/>
-          </a:fontRef>
-        </p:style>
-        <p:txBody>
-          <a:bodyPr rtlCol="0" anchor="ctr"/>
-          <a:lstStyle/>
-          <a:p>
-            <a:pPr algn="ctr"/>
-            <a:r>
-              <a:rPr lang="pt-BR" sz="1900" b="1" dirty="0" smtClean="0"/>
-              <a:t>Período</a:t>
-            </a:r>
-            <a:endParaRPr lang="pt-BR" sz="1900" b="1" dirty="0"/>
-          </a:p>
-        </p:txBody>
-      </p:sp>
-      <p:sp>
-        <p:nvSpPr>
           <p:cNvPr id="14" name="Retângulo: Cantos Arredondados 13">
             <a:extLst>
               <a:ext uri="{FF2B5EF4-FFF2-40B4-BE49-F238E27FC236}">
@@ -4372,60 +4318,6 @@
       </p:sp>
       <p:sp>
         <p:nvSpPr>
-          <p:cNvPr id="6" name="Retângulo: Cantos Arredondados 5">
-            <a:extLst>
-              <a:ext uri="{FF2B5EF4-FFF2-40B4-BE49-F238E27FC236}">
-                <a16:creationId xmlns:a16="http://schemas.microsoft.com/office/drawing/2014/main" id="{8B2F3C4F-CE1F-4C8A-8E47-4ED9E593C966}"/>
-              </a:ext>
-            </a:extLst>
-          </p:cNvPr>
-          <p:cNvSpPr/>
-          <p:nvPr/>
-        </p:nvSpPr>
-        <p:spPr>
-          <a:xfrm>
-            <a:off x="10344424" y="27589"/>
-            <a:ext cx="1082154" cy="349625"/>
-          </a:xfrm>
-          <a:prstGeom prst="roundRect">
-            <a:avLst/>
-          </a:prstGeom>
-          <a:noFill/>
-          <a:ln>
-            <a:noFill/>
-          </a:ln>
-        </p:spPr>
-        <p:style>
-          <a:lnRef idx="2">
-            <a:schemeClr val="dk1">
-              <a:shade val="50000"/>
-            </a:schemeClr>
-          </a:lnRef>
-          <a:fillRef idx="1">
-            <a:schemeClr val="dk1"/>
-          </a:fillRef>
-          <a:effectRef idx="0">
-            <a:schemeClr val="dk1"/>
-          </a:effectRef>
-          <a:fontRef idx="minor">
-            <a:schemeClr val="lt1"/>
-          </a:fontRef>
-        </p:style>
-        <p:txBody>
-          <a:bodyPr rtlCol="0" anchor="ctr"/>
-          <a:lstStyle/>
-          <a:p>
-            <a:pPr algn="ctr"/>
-            <a:r>
-              <a:rPr lang="pt-BR" sz="1900" b="1" dirty="0" smtClean="0"/>
-              <a:t>Período</a:t>
-            </a:r>
-            <a:endParaRPr lang="pt-BR" sz="1900" b="1" dirty="0"/>
-          </a:p>
-        </p:txBody>
-      </p:sp>
-      <p:sp>
-        <p:nvSpPr>
           <p:cNvPr id="14" name="Retângulo: Cantos Arredondados 13">
             <a:extLst>
               <a:ext uri="{FF2B5EF4-FFF2-40B4-BE49-F238E27FC236}">
@@ -5256,77 +5148,6 @@
                 <a:schemeClr val="bg1"/>
               </a:solidFill>
             </a:endParaRPr>
-          </a:p>
-        </p:txBody>
-      </p:sp>
-      <p:sp>
-        <p:nvSpPr>
-          <p:cNvPr id="3" name="Retângulo 2">
-            <a:extLst>
-              <a:ext uri="{FF2B5EF4-FFF2-40B4-BE49-F238E27FC236}">
-                <a16:creationId xmlns:a16="http://schemas.microsoft.com/office/drawing/2014/main" id="{96E7DBD0-4681-43FA-ADE3-532C2E896B34}"/>
-              </a:ext>
-            </a:extLst>
-          </p:cNvPr>
-          <p:cNvSpPr/>
-          <p:nvPr/>
-        </p:nvSpPr>
-        <p:spPr>
-          <a:xfrm>
-            <a:off x="0" y="6131859"/>
-            <a:ext cx="5109883" cy="779929"/>
-          </a:xfrm>
-          <a:prstGeom prst="rect">
-            <a:avLst/>
-          </a:prstGeom>
-          <a:solidFill>
-            <a:schemeClr val="tx1">
-              <a:lumMod val="85000"/>
-              <a:lumOff val="15000"/>
-            </a:schemeClr>
-          </a:solidFill>
-          <a:ln>
-            <a:noFill/>
-          </a:ln>
-        </p:spPr>
-        <p:style>
-          <a:lnRef idx="2">
-            <a:schemeClr val="accent1">
-              <a:shade val="50000"/>
-            </a:schemeClr>
-          </a:lnRef>
-          <a:fillRef idx="1">
-            <a:schemeClr val="accent1"/>
-          </a:fillRef>
-          <a:effectRef idx="0">
-            <a:schemeClr val="accent1"/>
-          </a:effectRef>
-          <a:fontRef idx="minor">
-            <a:schemeClr val="lt1"/>
-          </a:fontRef>
-        </p:style>
-        <p:txBody>
-          <a:bodyPr rtlCol="0" anchor="ctr"/>
-          <a:lstStyle/>
-          <a:p>
-            <a:pPr algn="ctr"/>
-            <a:r>
-              <a:rPr lang="pt-BR" dirty="0" err="1">
-                <a:solidFill>
-                  <a:schemeClr val="bg1"/>
-                </a:solidFill>
-              </a:rPr>
-              <a:t>Ctrl</a:t>
-            </a:r>
-            <a:r>
-              <a:rPr lang="pt-BR" dirty="0">
-                <a:solidFill>
-                  <a:schemeClr val="bg1"/>
-                </a:solidFill>
-              </a:rPr>
-              <a:t> + Clique do mouse – Navegar entre os painéis.</a:t>
-            </a:r>
-            <a:endParaRPr lang="pt-BR" dirty="0"/>
           </a:p>
         </p:txBody>
       </p:sp>

</xml_diff>